<commit_message>
add half monthly report in 20240322
</commit_message>
<xml_diff>
--- a/过程汇报/half-monthly-report.pptx
+++ b/过程汇报/half-monthly-report.pptx
@@ -11,29 +11,37 @@
     <p:sldId id="256" r:id="rId3"/>
     <p:sldId id="262" r:id="rId5"/>
     <p:sldId id="263" r:id="rId6"/>
-    <p:sldId id="264" r:id="rId7"/>
-    <p:sldId id="265" r:id="rId8"/>
-    <p:sldId id="266" r:id="rId9"/>
-    <p:sldId id="267" r:id="rId10"/>
-    <p:sldId id="268" r:id="rId11"/>
-    <p:sldId id="269" r:id="rId12"/>
-    <p:sldId id="270" r:id="rId13"/>
-    <p:sldId id="271" r:id="rId14"/>
-    <p:sldId id="272" r:id="rId15"/>
-    <p:sldId id="273" r:id="rId16"/>
-    <p:sldId id="274" r:id="rId17"/>
-    <p:sldId id="275" r:id="rId18"/>
-    <p:sldId id="276" r:id="rId19"/>
-    <p:sldId id="277" r:id="rId20"/>
-    <p:sldId id="258" r:id="rId21"/>
-    <p:sldId id="257" r:id="rId22"/>
-    <p:sldId id="278" r:id="rId23"/>
-    <p:sldId id="279" r:id="rId24"/>
+    <p:sldId id="290" r:id="rId7"/>
+    <p:sldId id="264" r:id="rId8"/>
+    <p:sldId id="265" r:id="rId9"/>
+    <p:sldId id="266" r:id="rId10"/>
+    <p:sldId id="267" r:id="rId11"/>
+    <p:sldId id="268" r:id="rId12"/>
+    <p:sldId id="269" r:id="rId13"/>
+    <p:sldId id="270" r:id="rId14"/>
+    <p:sldId id="271" r:id="rId15"/>
+    <p:sldId id="272" r:id="rId16"/>
+    <p:sldId id="273" r:id="rId17"/>
+    <p:sldId id="274" r:id="rId18"/>
+    <p:sldId id="275" r:id="rId19"/>
+    <p:sldId id="276" r:id="rId20"/>
+    <p:sldId id="277" r:id="rId21"/>
+    <p:sldId id="258" r:id="rId22"/>
+    <p:sldId id="257" r:id="rId23"/>
+    <p:sldId id="278" r:id="rId24"/>
+    <p:sldId id="279" r:id="rId25"/>
+    <p:sldId id="282" r:id="rId26"/>
+    <p:sldId id="286" r:id="rId27"/>
+    <p:sldId id="283" r:id="rId28"/>
+    <p:sldId id="288" r:id="rId29"/>
+    <p:sldId id="289" r:id="rId30"/>
+    <p:sldId id="287" r:id="rId31"/>
+    <p:sldId id="285" r:id="rId32"/>
   </p:sldIdLst>
   <p:sldSz cx="12192000" cy="6858000"/>
   <p:notesSz cx="6858000" cy="9144000"/>
   <p:custDataLst>
-    <p:tags r:id="rId28"/>
+    <p:tags r:id="rId36"/>
   </p:custDataLst>
   <p:defaultTextStyle>
     <a:defPPr>
@@ -583,6 +591,39 @@
         <p:txBody>
           <a:bodyPr/>
           <a:p>
+            <a:pPr lvl="1" indent="0">
+              <a:buNone/>
+            </a:pPr>
+            <a:r>
+              <a:rPr lang="zh-CN" altLang="en-US">
+                <a:sym typeface="+mn-ea"/>
+              </a:rPr>
+              <a:t>传统的文档编写方式直观，但是遇到重复和冗余时编写效率低</a:t>
+            </a:r>
+            <a:endParaRPr lang="zh-CN" altLang="en-US"/>
+          </a:p>
+          <a:p>
+            <a:pPr lvl="1" indent="0">
+              <a:buNone/>
+            </a:pPr>
+            <a:r>
+              <a:rPr lang="zh-CN" altLang="en-US">
+                <a:sym typeface="+mn-ea"/>
+              </a:rPr>
+              <a:t>用程序生成文档的效率高，但是不直观、有门槛</a:t>
+            </a:r>
+            <a:endParaRPr lang="zh-CN" altLang="en-US"/>
+          </a:p>
+          <a:p>
+            <a:pPr lvl="1" indent="0">
+              <a:buNone/>
+            </a:pPr>
+            <a:r>
+              <a:rPr lang="zh-CN" altLang="en-US">
+                <a:sym typeface="+mn-ea"/>
+              </a:rPr>
+              <a:t>提出一种文档语言，既支持程序生成文档，又支持对文档的直接修改同步更新程序。好处是既提高文档编写效率，又直观，且降低了编写门槛</a:t>
+            </a:r>
             <a:endParaRPr lang="zh-CN" altLang="en-US"/>
           </a:p>
         </p:txBody>
@@ -644,6 +685,102 @@
 </file>
 
 <file path=ppt/notesSlides/notesSlide4.xml><?xml version="1.0" encoding="utf-8"?>
+<p:notes xmlns:a="http://schemas.openxmlformats.org/drawingml/2006/main" xmlns:r="http://schemas.openxmlformats.org/officeDocument/2006/relationships" xmlns:p="http://schemas.openxmlformats.org/presentationml/2006/main">
+  <p:cSld>
+    <p:spTree>
+      <p:nvGrpSpPr>
+        <p:cNvPr id="1" name=""/>
+        <p:cNvGrpSpPr/>
+        <p:nvPr/>
+      </p:nvGrpSpPr>
+      <p:grpSpPr/>
+      <p:sp>
+        <p:nvSpPr>
+          <p:cNvPr id="2" name="幻灯片图像占位符 1"/>
+          <p:cNvSpPr>
+            <a:spLocks noGrp="1"/>
+          </p:cNvSpPr>
+          <p:nvPr>
+            <p:ph type="sldImg" idx="2"/>
+          </p:nvPr>
+        </p:nvSpPr>
+        <p:spPr/>
+      </p:sp>
+      <p:sp>
+        <p:nvSpPr>
+          <p:cNvPr id="3" name="文本占位符 2"/>
+          <p:cNvSpPr>
+            <a:spLocks noGrp="1"/>
+          </p:cNvSpPr>
+          <p:nvPr>
+            <p:ph type="body" idx="3"/>
+          </p:nvPr>
+        </p:nvSpPr>
+        <p:spPr/>
+        <p:txBody>
+          <a:bodyPr/>
+          <a:p>
+            <a:endParaRPr lang="zh-CN" altLang="en-US"/>
+          </a:p>
+        </p:txBody>
+      </p:sp>
+    </p:spTree>
+  </p:cSld>
+  <p:clrMapOvr>
+    <a:masterClrMapping/>
+  </p:clrMapOvr>
+</p:notes>
+</file>
+
+<file path=ppt/notesSlides/notesSlide5.xml><?xml version="1.0" encoding="utf-8"?>
+<p:notes xmlns:a="http://schemas.openxmlformats.org/drawingml/2006/main" xmlns:r="http://schemas.openxmlformats.org/officeDocument/2006/relationships" xmlns:p="http://schemas.openxmlformats.org/presentationml/2006/main">
+  <p:cSld>
+    <p:spTree>
+      <p:nvGrpSpPr>
+        <p:cNvPr id="1" name=""/>
+        <p:cNvGrpSpPr/>
+        <p:nvPr/>
+      </p:nvGrpSpPr>
+      <p:grpSpPr/>
+      <p:sp>
+        <p:nvSpPr>
+          <p:cNvPr id="2" name="幻灯片图像占位符 1"/>
+          <p:cNvSpPr>
+            <a:spLocks noGrp="1"/>
+          </p:cNvSpPr>
+          <p:nvPr>
+            <p:ph type="sldImg" idx="2"/>
+          </p:nvPr>
+        </p:nvSpPr>
+        <p:spPr/>
+      </p:sp>
+      <p:sp>
+        <p:nvSpPr>
+          <p:cNvPr id="3" name="文本占位符 2"/>
+          <p:cNvSpPr>
+            <a:spLocks noGrp="1"/>
+          </p:cNvSpPr>
+          <p:nvPr>
+            <p:ph type="body" idx="3"/>
+          </p:nvPr>
+        </p:nvSpPr>
+        <p:spPr/>
+        <p:txBody>
+          <a:bodyPr/>
+          <a:p>
+            <a:endParaRPr lang="zh-CN" altLang="en-US"/>
+          </a:p>
+        </p:txBody>
+      </p:sp>
+    </p:spTree>
+  </p:cSld>
+  <p:clrMapOvr>
+    <a:masterClrMapping/>
+  </p:clrMapOvr>
+</p:notes>
+</file>
+
+<file path=ppt/notesSlides/notesSlide6.xml><?xml version="1.0" encoding="utf-8"?>
 <p:notes xmlns:a="http://schemas.openxmlformats.org/drawingml/2006/main" xmlns:r="http://schemas.openxmlformats.org/officeDocument/2006/relationships" xmlns:p="http://schemas.openxmlformats.org/presentationml/2006/main">
   <p:cSld>
     <p:spTree>
@@ -4028,6 +4165,544 @@
             <a:avLst/>
           </a:prstGeom>
           <a:ln w="9525">
+            <a:headEnd type="arrow"/>
+            <a:tailEnd type="none"/>
+          </a:ln>
+        </p:spPr>
+        <p:style>
+          <a:lnRef idx="2">
+            <a:schemeClr val="accent1"/>
+          </a:lnRef>
+          <a:fillRef idx="0">
+            <a:srgbClr val="FFFFFF"/>
+          </a:fillRef>
+          <a:effectRef idx="0">
+            <a:srgbClr val="FFFFFF"/>
+          </a:effectRef>
+          <a:fontRef idx="minor">
+            <a:schemeClr val="tx1"/>
+          </a:fontRef>
+        </p:style>
+      </p:cxnSp>
+      <p:sp>
+        <p:nvSpPr>
+          <p:cNvPr id="16" name="文本框 15"/>
+          <p:cNvSpPr txBox="1"/>
+          <p:nvPr>
+            <p:custDataLst>
+              <p:tags r:id="rId11"/>
+            </p:custDataLst>
+          </p:nvPr>
+        </p:nvSpPr>
+        <p:spPr>
+          <a:xfrm>
+            <a:off x="4551045" y="4973320"/>
+            <a:ext cx="1544955" cy="275590"/>
+          </a:xfrm>
+          <a:prstGeom prst="rect">
+            <a:avLst/>
+          </a:prstGeom>
+          <a:noFill/>
+        </p:spPr>
+        <p:txBody>
+          <a:bodyPr wrap="square" rtlCol="0">
+            <a:spAutoFit/>
+          </a:bodyPr>
+          <a:p>
+            <a:r>
+              <a:rPr lang="en-US" altLang="zh-CN" sz="1200"/>
+              <a:t>backward evaluation</a:t>
+            </a:r>
+            <a:endParaRPr lang="en-US" altLang="zh-CN" sz="1200"/>
+          </a:p>
+        </p:txBody>
+      </p:sp>
+    </p:spTree>
+  </p:cSld>
+  <p:clrMapOvr>
+    <a:masterClrMapping/>
+  </p:clrMapOvr>
+</p:sld>
+</file>
+
+<file path=ppt/slides/slide11.xml><?xml version="1.0" encoding="utf-8"?>
+<p:sld xmlns:a="http://schemas.openxmlformats.org/drawingml/2006/main" xmlns:r="http://schemas.openxmlformats.org/officeDocument/2006/relationships" xmlns:p="http://schemas.openxmlformats.org/presentationml/2006/main">
+  <p:cSld>
+    <p:spTree>
+      <p:nvGrpSpPr>
+        <p:cNvPr id="1" name=""/>
+        <p:cNvGrpSpPr/>
+        <p:nvPr/>
+      </p:nvGrpSpPr>
+      <p:grpSpPr/>
+      <p:sp>
+        <p:nvSpPr>
+          <p:cNvPr id="2" name="标题 1"/>
+          <p:cNvSpPr>
+            <a:spLocks noGrp="1"/>
+          </p:cNvSpPr>
+          <p:nvPr>
+            <p:ph type="title"/>
+          </p:nvPr>
+        </p:nvSpPr>
+        <p:spPr/>
+        <p:txBody>
+          <a:bodyPr/>
+          <a:p>
+            <a:r>
+              <a:rPr lang="en-US" altLang="zh-CN"/>
+              <a:t>Bidirectional Document Calculus</a:t>
+            </a:r>
+            <a:endParaRPr lang="en-US" altLang="zh-CN"/>
+          </a:p>
+        </p:txBody>
+      </p:sp>
+      <p:sp>
+        <p:nvSpPr>
+          <p:cNvPr id="3" name="内容占位符 2"/>
+          <p:cNvSpPr>
+            <a:spLocks noGrp="1"/>
+          </p:cNvSpPr>
+          <p:nvPr>
+            <p:ph idx="1"/>
+          </p:nvPr>
+        </p:nvSpPr>
+        <p:spPr/>
+        <p:txBody>
+          <a:bodyPr/>
+          <a:p>
+            <a:r>
+              <a:rPr lang="en-US" altLang="zh-CN" b="1"/>
+              <a:t>Question:</a:t>
+            </a:r>
+            <a:r>
+              <a:rPr lang="en-US" altLang="zh-CN"/>
+              <a:t> Design the </a:t>
+            </a:r>
+            <a:r>
+              <a:rPr lang="en-US" altLang="zh-CN" b="1">
+                <a:solidFill>
+                  <a:schemeClr val="accent6">
+                    <a:lumMod val="60000"/>
+                    <a:lumOff val="40000"/>
+                  </a:schemeClr>
+                </a:solidFill>
+              </a:rPr>
+              <a:t>Bidirectional Evaluation</a:t>
+            </a:r>
+            <a:r>
+              <a:rPr lang="en-US" altLang="zh-CN"/>
+              <a:t> for the </a:t>
+            </a:r>
+            <a:r>
+              <a:rPr lang="en-US" altLang="zh-CN" b="1">
+                <a:solidFill>
+                  <a:schemeClr val="accent5">
+                    <a:lumMod val="75000"/>
+                  </a:schemeClr>
+                </a:solidFill>
+              </a:rPr>
+              <a:t>Core Calculus of Documents</a:t>
+            </a:r>
+            <a:r>
+              <a:rPr lang="en-US" altLang="zh-CN"/>
+              <a:t> - more specifically - </a:t>
+            </a:r>
+            <a:r>
+              <a:rPr lang="en-US" altLang="zh-CN" b="1">
+                <a:solidFill>
+                  <a:schemeClr val="accent5">
+                    <a:lumMod val="60000"/>
+                    <a:lumOff val="40000"/>
+                  </a:schemeClr>
+                </a:solidFill>
+              </a:rPr>
+              <a:t>Article Template Program</a:t>
+            </a:r>
+            <a:r>
+              <a:rPr lang="en-US" altLang="zh-CN"/>
+              <a:t>. Futhermore, explore the way to </a:t>
+            </a:r>
+            <a:r>
+              <a:rPr lang="en-US" altLang="zh-CN" b="1">
+                <a:solidFill>
+                  <a:schemeClr val="accent4">
+                    <a:lumMod val="75000"/>
+                  </a:schemeClr>
+                </a:solidFill>
+              </a:rPr>
+              <a:t>extend</a:t>
+            </a:r>
+            <a:r>
+              <a:rPr lang="en-US" altLang="zh-CN" b="1"/>
+              <a:t> </a:t>
+            </a:r>
+            <a:r>
+              <a:rPr lang="en-US" altLang="zh-CN"/>
+              <a:t>it </a:t>
+            </a:r>
+            <a:r>
+              <a:rPr lang="en-US" altLang="zh-CN" b="1">
+                <a:solidFill>
+                  <a:schemeClr val="accent4">
+                    <a:lumMod val="75000"/>
+                  </a:schemeClr>
+                </a:solidFill>
+              </a:rPr>
+              <a:t>with reactivity</a:t>
+            </a:r>
+            <a:r>
+              <a:rPr lang="en-US" altLang="zh-CN"/>
+              <a:t>.</a:t>
+            </a:r>
+            <a:endParaRPr lang="en-US" altLang="zh-CN"/>
+          </a:p>
+          <a:p>
+            <a:r>
+              <a:rPr lang="en-US" altLang="zh-CN" b="1"/>
+              <a:t>Motivation Example</a:t>
+            </a:r>
+            <a:r>
+              <a:rPr lang="en-US" altLang="zh-CN" b="1">
+                <a:sym typeface="+mn-ea"/>
+              </a:rPr>
+              <a:t> --</a:t>
+            </a:r>
+            <a:r>
+              <a:rPr lang="en-US" altLang="zh-CN" sz="2000" b="1">
+                <a:sym typeface="+mn-ea"/>
+              </a:rPr>
+              <a:t>structural modification</a:t>
+            </a:r>
+            <a:endParaRPr lang="en-US" altLang="zh-CN"/>
+          </a:p>
+        </p:txBody>
+      </p:sp>
+      <p:pic>
+        <p:nvPicPr>
+          <p:cNvPr id="4" name="图片 3"/>
+          <p:cNvPicPr>
+            <a:picLocks noChangeAspect="1"/>
+          </p:cNvPicPr>
+          <p:nvPr>
+            <p:custDataLst>
+              <p:tags r:id="rId1"/>
+            </p:custDataLst>
+          </p:nvPr>
+        </p:nvPicPr>
+        <p:blipFill>
+          <a:blip r:embed="rId2"/>
+          <a:srcRect l="9725"/>
+          <a:stretch>
+            <a:fillRect/>
+          </a:stretch>
+        </p:blipFill>
+        <p:spPr>
+          <a:xfrm>
+            <a:off x="1134110" y="3767455"/>
+            <a:ext cx="2747010" cy="1536700"/>
+          </a:xfrm>
+          <a:prstGeom prst="rect">
+            <a:avLst/>
+          </a:prstGeom>
+        </p:spPr>
+      </p:pic>
+      <p:pic>
+        <p:nvPicPr>
+          <p:cNvPr id="5" name="图片 4"/>
+          <p:cNvPicPr>
+            <a:picLocks noChangeAspect="1"/>
+          </p:cNvPicPr>
+          <p:nvPr>
+            <p:custDataLst>
+              <p:tags r:id="rId3"/>
+            </p:custDataLst>
+          </p:nvPr>
+        </p:nvPicPr>
+        <p:blipFill>
+          <a:blip r:embed="rId4"/>
+          <a:srcRect l="30378" t="-10461"/>
+          <a:stretch>
+            <a:fillRect/>
+          </a:stretch>
+        </p:blipFill>
+        <p:spPr>
+          <a:xfrm>
+            <a:off x="1134110" y="5851525"/>
+            <a:ext cx="678180" cy="730885"/>
+          </a:xfrm>
+          <a:prstGeom prst="rect">
+            <a:avLst/>
+          </a:prstGeom>
+        </p:spPr>
+      </p:pic>
+      <p:cxnSp>
+        <p:nvCxnSpPr>
+          <p:cNvPr id="6" name="直接箭头连接符 5"/>
+          <p:cNvCxnSpPr/>
+          <p:nvPr/>
+        </p:nvCxnSpPr>
+        <p:spPr>
+          <a:xfrm>
+            <a:off x="1134110" y="5289550"/>
+            <a:ext cx="10160" cy="576580"/>
+          </a:xfrm>
+          <a:prstGeom prst="straightConnector1">
+            <a:avLst/>
+          </a:prstGeom>
+          <a:ln>
+            <a:solidFill>
+              <a:schemeClr val="accent1">
+                <a:lumMod val="40000"/>
+                <a:lumOff val="60000"/>
+              </a:schemeClr>
+            </a:solidFill>
+            <a:tailEnd type="arrow"/>
+          </a:ln>
+        </p:spPr>
+        <p:style>
+          <a:lnRef idx="2">
+            <a:schemeClr val="accent1"/>
+          </a:lnRef>
+          <a:fillRef idx="0">
+            <a:srgbClr val="FFFFFF"/>
+          </a:fillRef>
+          <a:effectRef idx="0">
+            <a:srgbClr val="FFFFFF"/>
+          </a:effectRef>
+          <a:fontRef idx="minor">
+            <a:schemeClr val="tx1"/>
+          </a:fontRef>
+        </p:style>
+      </p:cxnSp>
+      <p:sp>
+        <p:nvSpPr>
+          <p:cNvPr id="7" name="文本框 6"/>
+          <p:cNvSpPr txBox="1"/>
+          <p:nvPr/>
+        </p:nvSpPr>
+        <p:spPr>
+          <a:xfrm>
+            <a:off x="1285875" y="5440045"/>
+            <a:ext cx="1594485" cy="275590"/>
+          </a:xfrm>
+          <a:prstGeom prst="rect">
+            <a:avLst/>
+          </a:prstGeom>
+          <a:noFill/>
+        </p:spPr>
+        <p:txBody>
+          <a:bodyPr wrap="square" rtlCol="0">
+            <a:spAutoFit/>
+          </a:bodyPr>
+          <a:p>
+            <a:r>
+              <a:rPr lang="en-US" altLang="zh-CN" sz="1200"/>
+              <a:t>forward evaluation</a:t>
+            </a:r>
+            <a:endParaRPr lang="en-US" altLang="zh-CN" sz="1200"/>
+          </a:p>
+        </p:txBody>
+      </p:sp>
+      <p:cxnSp>
+        <p:nvCxnSpPr>
+          <p:cNvPr id="8" name="直接箭头连接符 7"/>
+          <p:cNvCxnSpPr/>
+          <p:nvPr>
+            <p:custDataLst>
+              <p:tags r:id="rId5"/>
+            </p:custDataLst>
+          </p:nvPr>
+        </p:nvCxnSpPr>
+        <p:spPr>
+          <a:xfrm>
+            <a:off x="1812290" y="6224270"/>
+            <a:ext cx="3539490" cy="8890"/>
+          </a:xfrm>
+          <a:prstGeom prst="straightConnector1">
+            <a:avLst/>
+          </a:prstGeom>
+          <a:ln>
+            <a:solidFill>
+              <a:schemeClr val="accent1">
+                <a:lumMod val="40000"/>
+                <a:lumOff val="60000"/>
+              </a:schemeClr>
+            </a:solidFill>
+            <a:tailEnd type="arrow"/>
+          </a:ln>
+        </p:spPr>
+        <p:style>
+          <a:lnRef idx="2">
+            <a:schemeClr val="accent1"/>
+          </a:lnRef>
+          <a:fillRef idx="0">
+            <a:srgbClr val="FFFFFF"/>
+          </a:fillRef>
+          <a:effectRef idx="0">
+            <a:srgbClr val="FFFFFF"/>
+          </a:effectRef>
+          <a:fontRef idx="minor">
+            <a:schemeClr val="tx1"/>
+          </a:fontRef>
+        </p:style>
+      </p:cxnSp>
+      <p:sp>
+        <p:nvSpPr>
+          <p:cNvPr id="9" name="文本框 8"/>
+          <p:cNvSpPr txBox="1"/>
+          <p:nvPr>
+            <p:custDataLst>
+              <p:tags r:id="rId6"/>
+            </p:custDataLst>
+          </p:nvPr>
+        </p:nvSpPr>
+        <p:spPr>
+          <a:xfrm>
+            <a:off x="3226435" y="6311900"/>
+            <a:ext cx="654685" cy="275590"/>
+          </a:xfrm>
+          <a:prstGeom prst="rect">
+            <a:avLst/>
+          </a:prstGeom>
+          <a:noFill/>
+        </p:spPr>
+        <p:txBody>
+          <a:bodyPr wrap="square" rtlCol="0">
+            <a:spAutoFit/>
+          </a:bodyPr>
+          <a:p>
+            <a:r>
+              <a:rPr lang="en-US" altLang="zh-CN" sz="1200"/>
+              <a:t>modify</a:t>
+            </a:r>
+            <a:endParaRPr lang="en-US" altLang="zh-CN" sz="1200"/>
+          </a:p>
+        </p:txBody>
+      </p:sp>
+      <p:grpSp>
+        <p:nvGrpSpPr>
+          <p:cNvPr id="12" name="组合 11"/>
+          <p:cNvGrpSpPr/>
+          <p:nvPr/>
+        </p:nvGrpSpPr>
+        <p:grpSpPr>
+          <a:xfrm>
+            <a:off x="5642610" y="6177280"/>
+            <a:ext cx="466090" cy="608330"/>
+            <a:chOff x="9891" y="9728"/>
+            <a:chExt cx="734" cy="958"/>
+          </a:xfrm>
+        </p:grpSpPr>
+        <p:pic>
+          <p:nvPicPr>
+            <p:cNvPr id="10" name="图片 9"/>
+            <p:cNvPicPr>
+              <a:picLocks noChangeAspect="1"/>
+            </p:cNvPicPr>
+            <p:nvPr>
+              <p:custDataLst>
+                <p:tags r:id="rId7"/>
+              </p:custDataLst>
+            </p:nvPr>
+          </p:nvPicPr>
+          <p:blipFill>
+            <a:blip r:embed="rId8"/>
+            <a:stretch>
+              <a:fillRect/>
+            </a:stretch>
+          </p:blipFill>
+          <p:spPr>
+            <a:xfrm>
+              <a:off x="9891" y="9728"/>
+              <a:ext cx="734" cy="958"/>
+            </a:xfrm>
+            <a:prstGeom prst="rect">
+              <a:avLst/>
+            </a:prstGeom>
+          </p:spPr>
+        </p:pic>
+        <p:sp>
+          <p:nvSpPr>
+            <p:cNvPr id="11" name="矩形 10"/>
+            <p:cNvSpPr/>
+            <p:nvPr>
+              <p:custDataLst>
+                <p:tags r:id="rId9"/>
+              </p:custDataLst>
+            </p:nvPr>
+          </p:nvSpPr>
+          <p:spPr>
+            <a:xfrm>
+              <a:off x="9891" y="10374"/>
+              <a:ext cx="735" cy="311"/>
+            </a:xfrm>
+            <a:prstGeom prst="rect">
+              <a:avLst/>
+            </a:prstGeom>
+            <a:noFill/>
+            <a:ln>
+              <a:solidFill>
+                <a:schemeClr val="accent6">
+                  <a:lumMod val="60000"/>
+                  <a:lumOff val="40000"/>
+                </a:schemeClr>
+              </a:solidFill>
+            </a:ln>
+            <a:extLst>
+              <a:ext uri="{909E8E84-426E-40DD-AFC4-6F175D3DCCD1}">
+                <a14:hiddenFill xmlns:a14="http://schemas.microsoft.com/office/drawing/2010/main">
+                  <a:solidFill>
+                    <a:schemeClr val="accent1"/>
+                  </a:solidFill>
+                </a14:hiddenFill>
+              </a:ext>
+            </a:extLst>
+          </p:spPr>
+          <p:style>
+            <a:lnRef idx="2">
+              <a:schemeClr val="accent1">
+                <a:lumMod val="75000"/>
+              </a:schemeClr>
+            </a:lnRef>
+            <a:fillRef idx="1">
+              <a:schemeClr val="accent1"/>
+            </a:fillRef>
+            <a:effectRef idx="0">
+              <a:srgbClr val="FFFFFF"/>
+            </a:effectRef>
+            <a:fontRef idx="minor">
+              <a:schemeClr val="lt1"/>
+            </a:fontRef>
+          </p:style>
+          <p:txBody>
+            <a:bodyPr rtlCol="0" anchor="ctr"/>
+            <a:p>
+              <a:pPr algn="ctr"/>
+              <a:endParaRPr lang="zh-CN" altLang="en-US"/>
+            </a:p>
+          </p:txBody>
+        </p:sp>
+      </p:grpSp>
+      <p:cxnSp>
+        <p:nvCxnSpPr>
+          <p:cNvPr id="15" name="直接箭头连接符 14"/>
+          <p:cNvCxnSpPr/>
+          <p:nvPr>
+            <p:custDataLst>
+              <p:tags r:id="rId10"/>
+            </p:custDataLst>
+          </p:nvPr>
+        </p:nvCxnSpPr>
+        <p:spPr>
+          <a:xfrm>
+            <a:off x="3881120" y="4535805"/>
+            <a:ext cx="1410335" cy="1370330"/>
+          </a:xfrm>
+          <a:prstGeom prst="straightConnector1">
+            <a:avLst/>
+          </a:prstGeom>
+          <a:ln w="9525">
             <a:solidFill>
               <a:schemeClr val="accent1">
                 <a:lumMod val="40000"/>
@@ -4220,7 +4895,7 @@
 </p:sld>
 </file>
 
-<file path=ppt/slides/slide11.xml><?xml version="1.0" encoding="utf-8"?>
+<file path=ppt/slides/slide12.xml><?xml version="1.0" encoding="utf-8"?>
 <p:sld xmlns:a="http://schemas.openxmlformats.org/drawingml/2006/main" xmlns:r="http://schemas.openxmlformats.org/officeDocument/2006/relationships" xmlns:p="http://schemas.openxmlformats.org/presentationml/2006/main">
   <p:cSld>
     <p:spTree>
@@ -4370,7 +5045,7 @@
 </p:sld>
 </file>
 
-<file path=ppt/slides/slide12.xml><?xml version="1.0" encoding="utf-8"?>
+<file path=ppt/slides/slide13.xml><?xml version="1.0" encoding="utf-8"?>
 <p:sld xmlns:a="http://schemas.openxmlformats.org/drawingml/2006/main" xmlns:r="http://schemas.openxmlformats.org/officeDocument/2006/relationships" xmlns:p="http://schemas.openxmlformats.org/presentationml/2006/main" show="0">
   <p:cSld>
     <p:spTree>
@@ -4474,7 +5149,7 @@
       <p:sp>
         <p:nvSpPr>
           <p:cNvPr id="6" name="左箭头 5">
-            <a:hlinkClick r:id="rId3" tooltip="" action="ppaction://hlinksldjump"/>
+            <a:hlinkClick r:id="rId3" action="ppaction://hlinksldjump"/>
           </p:cNvPr>
           <p:cNvSpPr/>
           <p:nvPr/>
@@ -4566,7 +5241,7 @@
 </p:sld>
 </file>
 
-<file path=ppt/slides/slide13.xml><?xml version="1.0" encoding="utf-8"?>
+<file path=ppt/slides/slide14.xml><?xml version="1.0" encoding="utf-8"?>
 <p:sld xmlns:a="http://schemas.openxmlformats.org/drawingml/2006/main" xmlns:r="http://schemas.openxmlformats.org/officeDocument/2006/relationships" xmlns:p="http://schemas.openxmlformats.org/presentationml/2006/main" show="0">
   <p:cSld>
     <p:spTree>
@@ -4686,7 +5361,7 @@
       <p:sp>
         <p:nvSpPr>
           <p:cNvPr id="7" name="左箭头 6">
-            <a:hlinkClick r:id="rId5" tooltip="" action="ppaction://hlinksldjump"/>
+            <a:hlinkClick r:id="rId5" action="ppaction://hlinksldjump"/>
           </p:cNvPr>
           <p:cNvSpPr/>
           <p:nvPr>
@@ -4786,7 +5461,7 @@
 </p:sld>
 </file>
 
-<file path=ppt/slides/slide14.xml><?xml version="1.0" encoding="utf-8"?>
+<file path=ppt/slides/slide15.xml><?xml version="1.0" encoding="utf-8"?>
 <p:sld xmlns:a="http://schemas.openxmlformats.org/drawingml/2006/main" xmlns:r="http://schemas.openxmlformats.org/officeDocument/2006/relationships" xmlns:p="http://schemas.openxmlformats.org/presentationml/2006/main" show="0">
   <p:cSld>
     <p:spTree>
@@ -4916,7 +5591,7 @@
       <p:sp>
         <p:nvSpPr>
           <p:cNvPr id="6" name="左箭头 5">
-            <a:hlinkClick r:id="rId5" tooltip="" action="ppaction://hlinksldjump"/>
+            <a:hlinkClick r:id="rId5" action="ppaction://hlinksldjump"/>
           </p:cNvPr>
           <p:cNvSpPr/>
           <p:nvPr>
@@ -4967,7 +5642,7 @@
 </p:sld>
 </file>
 
-<file path=ppt/slides/slide15.xml><?xml version="1.0" encoding="utf-8"?>
+<file path=ppt/slides/slide16.xml><?xml version="1.0" encoding="utf-8"?>
 <p:sld xmlns:a="http://schemas.openxmlformats.org/drawingml/2006/main" xmlns:r="http://schemas.openxmlformats.org/officeDocument/2006/relationships" xmlns:p="http://schemas.openxmlformats.org/presentationml/2006/main" show="0">
   <p:cSld>
     <p:spTree>
@@ -5124,7 +5799,7 @@
 </p:sld>
 </file>
 
-<file path=ppt/slides/slide16.xml><?xml version="1.0" encoding="utf-8"?>
+<file path=ppt/slides/slide17.xml><?xml version="1.0" encoding="utf-8"?>
 <p:sld xmlns:a="http://schemas.openxmlformats.org/drawingml/2006/main" xmlns:r="http://schemas.openxmlformats.org/officeDocument/2006/relationships" xmlns:p="http://schemas.openxmlformats.org/presentationml/2006/main" show="0">
   <p:cSld>
     <p:spTree>
@@ -5688,7 +6363,7 @@
       <p:sp>
         <p:nvSpPr>
           <p:cNvPr id="22" name="左箭头 21">
-            <a:hlinkClick r:id="rId18" tooltip="" action="ppaction://hlinksldjump"/>
+            <a:hlinkClick r:id="rId18" action="ppaction://hlinksldjump"/>
           </p:cNvPr>
           <p:cNvSpPr/>
           <p:nvPr>
@@ -5739,7 +6414,7 @@
 </p:sld>
 </file>
 
-<file path=ppt/slides/slide17.xml><?xml version="1.0" encoding="utf-8"?>
+<file path=ppt/slides/slide18.xml><?xml version="1.0" encoding="utf-8"?>
 <p:sld xmlns:a="http://schemas.openxmlformats.org/drawingml/2006/main" xmlns:r="http://schemas.openxmlformats.org/officeDocument/2006/relationships" xmlns:p="http://schemas.openxmlformats.org/presentationml/2006/main" show="0">
   <p:cSld>
     <p:spTree>
@@ -5862,7 +6537,7 @@
       <p:sp>
         <p:nvSpPr>
           <p:cNvPr id="6" name="左箭头 5">
-            <a:hlinkClick r:id="rId5" tooltip="" action="ppaction://hlinksldjump"/>
+            <a:hlinkClick r:id="rId5" action="ppaction://hlinksldjump"/>
           </p:cNvPr>
           <p:cNvSpPr/>
           <p:nvPr>
@@ -5950,70 +6625,6 @@
 </p:sld>
 </file>
 
-<file path=ppt/slides/slide18.xml><?xml version="1.0" encoding="utf-8"?>
-<p:sld xmlns:a="http://schemas.openxmlformats.org/drawingml/2006/main" xmlns:r="http://schemas.openxmlformats.org/officeDocument/2006/relationships" xmlns:p="http://schemas.openxmlformats.org/presentationml/2006/main">
-  <p:cSld>
-    <p:spTree>
-      <p:nvGrpSpPr>
-        <p:cNvPr id="1" name=""/>
-        <p:cNvGrpSpPr/>
-        <p:nvPr/>
-      </p:nvGrpSpPr>
-      <p:grpSpPr/>
-      <p:sp>
-        <p:nvSpPr>
-          <p:cNvPr id="2" name="标题 1"/>
-          <p:cNvSpPr>
-            <a:spLocks noGrp="1"/>
-          </p:cNvSpPr>
-          <p:nvPr>
-            <p:ph type="ctrTitle"/>
-          </p:nvPr>
-        </p:nvSpPr>
-        <p:spPr/>
-        <p:txBody>
-          <a:bodyPr/>
-          <a:p>
-            <a:r>
-              <a:rPr lang="en-US" altLang="zh-CN"/>
-              <a:t>1</a:t>
-            </a:r>
-            <a:endParaRPr lang="en-US" altLang="zh-CN"/>
-          </a:p>
-        </p:txBody>
-      </p:sp>
-      <p:sp>
-        <p:nvSpPr>
-          <p:cNvPr id="3" name="副标题 2"/>
-          <p:cNvSpPr>
-            <a:spLocks noGrp="1"/>
-          </p:cNvSpPr>
-          <p:nvPr>
-            <p:ph type="subTitle" idx="1"/>
-          </p:nvPr>
-        </p:nvSpPr>
-        <p:spPr/>
-        <p:txBody>
-          <a:bodyPr/>
-          <a:p>
-            <a:r>
-              <a:rPr lang="en-US" altLang="zh-CN">
-                <a:sym typeface="+mn-ea"/>
-              </a:rPr>
-              <a:t>2024.03.08</a:t>
-            </a:r>
-            <a:endParaRPr lang="zh-CN" altLang="en-US"/>
-          </a:p>
-        </p:txBody>
-      </p:sp>
-    </p:spTree>
-  </p:cSld>
-  <p:clrMapOvr>
-    <a:masterClrMapping/>
-  </p:clrMapOvr>
-</p:sld>
-</file>
-
 <file path=ppt/slides/slide19.xml><?xml version="1.0" encoding="utf-8"?>
 <p:sld xmlns:a="http://schemas.openxmlformats.org/drawingml/2006/main" xmlns:r="http://schemas.openxmlformats.org/officeDocument/2006/relationships" xmlns:p="http://schemas.openxmlformats.org/presentationml/2006/main">
   <p:cSld>
@@ -6031,7 +6642,7 @@
             <a:spLocks noGrp="1"/>
           </p:cNvSpPr>
           <p:nvPr>
-            <p:ph type="title"/>
+            <p:ph type="ctrTitle"/>
           </p:nvPr>
         </p:nvSpPr>
         <p:spPr/>
@@ -6040,7 +6651,7 @@
           <a:p>
             <a:r>
               <a:rPr lang="en-US" altLang="zh-CN"/>
-              <a:t>Progress</a:t>
+              <a:t>1</a:t>
             </a:r>
             <a:endParaRPr lang="en-US" altLang="zh-CN"/>
           </a:p>
@@ -6048,132 +6659,25 @@
       </p:sp>
       <p:sp>
         <p:nvSpPr>
-          <p:cNvPr id="3" name="内容占位符 2"/>
+          <p:cNvPr id="3" name="副标题 2"/>
           <p:cNvSpPr>
             <a:spLocks noGrp="1"/>
           </p:cNvSpPr>
           <p:nvPr>
-            <p:ph idx="1"/>
+            <p:ph type="subTitle" idx="1"/>
           </p:nvPr>
         </p:nvSpPr>
         <p:spPr/>
         <p:txBody>
           <a:bodyPr/>
           <a:p>
-            <a:pPr marL="514350" indent="-514350">
-              <a:buAutoNum type="arabicPeriod"/>
-            </a:pPr>
-            <a:r>
-              <a:rPr lang="en-US" altLang="zh-CN" b="1"/>
-              <a:t>Read the paper</a:t>
-            </a:r>
-            <a:r>
-              <a:rPr lang="en-US" altLang="zh-CN"/>
-              <a:t> “</a:t>
-            </a:r>
-            <a:r>
-              <a:rPr lang="en-US" altLang="zh-CN" i="1"/>
-              <a:t>A Core Calculus for Documents, POPL’24” </a:t>
-            </a:r>
-            <a:r>
-              <a:rPr lang="en-US" altLang="zh-CN"/>
-              <a:t>and scan the code it implements.</a:t>
-            </a:r>
-            <a:endParaRPr lang="en-US" altLang="zh-CN" i="1"/>
-          </a:p>
-          <a:p>
-            <a:pPr marL="514350" indent="-514350">
-              <a:buAutoNum type="arabicPeriod"/>
-            </a:pPr>
-            <a:r>
-              <a:rPr lang="en-US" altLang="zh-CN" b="1"/>
-              <a:t>Read the paper</a:t>
-            </a:r>
-            <a:r>
-              <a:rPr lang="en-US" altLang="zh-CN"/>
-              <a:t> “</a:t>
-            </a:r>
-            <a:r>
-              <a:rPr lang="en-US" altLang="zh-CN" i="1"/>
-              <a:t>Bidirectional Evaluation with Direct Manipulation, OOPSLA’18</a:t>
-            </a:r>
-            <a:r>
-              <a:rPr lang="en-US" altLang="zh-CN"/>
-              <a:t>”</a:t>
-            </a:r>
-            <a:endParaRPr lang="en-US" altLang="zh-CN"/>
-          </a:p>
-          <a:p>
-            <a:pPr marL="514350" indent="-514350">
-              <a:buAutoNum type="arabicPeriod"/>
-            </a:pPr>
-            <a:r>
-              <a:rPr lang="en-US" altLang="zh-CN" b="1"/>
-              <a:t>Find </a:t>
-            </a:r>
-            <a:r>
-              <a:rPr lang="en-US" altLang="zh-CN"/>
-              <a:t>that there are </a:t>
-            </a:r>
-            <a:r>
-              <a:rPr lang="en-US" altLang="zh-CN" b="1"/>
-              <a:t>gaps between </a:t>
-            </a:r>
-            <a:r>
-              <a:rPr lang="en-US" altLang="zh-CN"/>
-              <a:t>the backward evaluation in stage two mentioned before </a:t>
-            </a:r>
-            <a:r>
-              <a:rPr lang="en-US" altLang="zh-CN" b="1"/>
-              <a:t>and </a:t>
-            </a:r>
-            <a:r>
-              <a:rPr lang="en-US" altLang="zh-CN"/>
-              <a:t>the </a:t>
-            </a:r>
             <a:r>
               <a:rPr lang="en-US" altLang="zh-CN">
                 <a:sym typeface="+mn-ea"/>
               </a:rPr>
-              <a:t>backward evaluation semantics </a:t>
-            </a:r>
-            <a:r>
-              <a:rPr lang="en-US" altLang="zh-CN"/>
-              <a:t>in OOPSLA’18 </a:t>
-            </a:r>
-            <a:r>
-              <a:rPr lang="en-US" altLang="zh-CN" b="1"/>
-              <a:t>when </a:t>
-            </a:r>
-            <a:r>
-              <a:rPr lang="en-US" altLang="zh-CN"/>
-              <a:t>multiple functions operating on list compose which the structural information gets lost, and </a:t>
-            </a:r>
-            <a:r>
-              <a:rPr lang="en-US" altLang="zh-CN" b="1"/>
-              <a:t>find an </a:t>
-            </a:r>
-            <a:r>
-              <a:rPr lang="en-US" altLang="zh-CN"/>
-              <a:t>ad-hoc </a:t>
-            </a:r>
-            <a:r>
-              <a:rPr lang="en-US" altLang="zh-CN" b="1"/>
-              <a:t>solution</a:t>
-            </a:r>
-            <a:endParaRPr lang="en-US" altLang="zh-CN"/>
-          </a:p>
-          <a:p>
-            <a:pPr marL="514350" indent="-514350">
-              <a:buAutoNum type="arabicPeriod"/>
-            </a:pPr>
-            <a:endParaRPr lang="en-US" altLang="zh-CN"/>
-          </a:p>
-          <a:p>
-            <a:pPr marL="514350" indent="-514350">
-              <a:buAutoNum type="arabicPeriod"/>
-            </a:pPr>
-            <a:endParaRPr lang="en-US" altLang="zh-CN"/>
+              <a:t>2024.03.08</a:t>
+            </a:r>
+            <a:endParaRPr lang="zh-CN" altLang="en-US"/>
           </a:p>
         </p:txBody>
       </p:sp>
@@ -6275,7 +6779,7 @@
           <a:p>
             <a:r>
               <a:rPr lang="en-US" altLang="zh-CN"/>
-              <a:t>Next Plan</a:t>
+              <a:t>Progress</a:t>
             </a:r>
             <a:endParaRPr lang="en-US" altLang="zh-CN"/>
           </a:p>
@@ -6300,31 +6804,19 @@
             </a:pPr>
             <a:r>
               <a:rPr lang="en-US" altLang="zh-CN" b="1"/>
-              <a:t>Make a summary</a:t>
+              <a:t>Read the paper</a:t>
             </a:r>
             <a:r>
               <a:rPr lang="en-US" altLang="zh-CN"/>
-              <a:t> of the core </a:t>
-            </a:r>
-            <a:r>
-              <a:rPr lang="en-US" altLang="zh-CN" b="1"/>
-              <a:t>syntax </a:t>
+              <a:t> “</a:t>
+            </a:r>
+            <a:r>
+              <a:rPr lang="en-US" altLang="zh-CN" i="1"/>
+              <a:t>A Core Calculus for Documents, POPL’24” </a:t>
             </a:r>
             <a:r>
               <a:rPr lang="en-US" altLang="zh-CN"/>
-              <a:t>and </a:t>
-            </a:r>
-            <a:r>
-              <a:rPr lang="en-US" altLang="zh-CN" b="1"/>
-              <a:t>semantics </a:t>
-            </a:r>
-            <a:r>
-              <a:rPr lang="en-US" altLang="zh-CN"/>
-              <a:t>of the document calculi - </a:t>
-            </a:r>
-            <a:r>
-              <a:rPr lang="en-US" altLang="zh-CN" i="1"/>
-              <a:t>Article Template Program.</a:t>
+              <a:t>and scan the code it implements.</a:t>
             </a:r>
             <a:endParaRPr lang="en-US" altLang="zh-CN" i="1"/>
           </a:p>
@@ -6334,103 +6826,92 @@
             </a:pPr>
             <a:r>
               <a:rPr lang="en-US" altLang="zh-CN" b="1"/>
-              <a:t>Find more</a:t>
+              <a:t>Read the paper</a:t>
             </a:r>
             <a:r>
               <a:rPr lang="en-US" altLang="zh-CN"/>
-              <a:t> examples that cover every primitive operations and perform backward evaluation using the </a:t>
-            </a:r>
-            <a:r>
-              <a:rPr lang="en-US" altLang="zh-CN">
-                <a:sym typeface="+mn-ea"/>
-              </a:rPr>
-              <a:t>backward evaluation semantics </a:t>
-            </a:r>
-            <a:r>
-              <a:rPr lang="en-US" altLang="zh-CN">
-                <a:sym typeface="+mn-ea"/>
-              </a:rPr>
-              <a:t>in OOPSLA’18 to find more </a:t>
-            </a:r>
-            <a:r>
-              <a:rPr lang="en-US" altLang="zh-CN" b="1">
-                <a:sym typeface="+mn-ea"/>
-              </a:rPr>
-              <a:t>gaps</a:t>
-            </a:r>
-            <a:r>
-              <a:rPr lang="en-US" altLang="zh-CN">
-                <a:sym typeface="+mn-ea"/>
-              </a:rPr>
-              <a:t>.</a:t>
-            </a:r>
-            <a:endParaRPr lang="en-US" altLang="zh-CN">
-              <a:sym typeface="+mn-ea"/>
-            </a:endParaRPr>
+              <a:t> “</a:t>
+            </a:r>
+            <a:r>
+              <a:rPr lang="en-US" altLang="zh-CN" i="1"/>
+              <a:t>Bidirectional Evaluation with Direct Manipulation, OOPSLA’18</a:t>
+            </a:r>
+            <a:r>
+              <a:rPr lang="en-US" altLang="zh-CN"/>
+              <a:t>”</a:t>
+            </a:r>
+            <a:endParaRPr lang="en-US" altLang="zh-CN"/>
           </a:p>
           <a:p>
             <a:pPr marL="514350" indent="-514350">
               <a:buAutoNum type="arabicPeriod"/>
             </a:pPr>
             <a:r>
-              <a:rPr lang="en-US" altLang="zh-CN" b="1">
-                <a:sym typeface="+mn-ea"/>
-              </a:rPr>
-              <a:t>Fill the gaps using general solution</a:t>
+              <a:rPr lang="en-US" altLang="zh-CN" b="1"/>
+              <a:t>Find </a:t>
+            </a:r>
+            <a:r>
+              <a:rPr lang="en-US" altLang="zh-CN"/>
+              <a:t>that there are </a:t>
+            </a:r>
+            <a:r>
+              <a:rPr lang="en-US" altLang="zh-CN" b="1"/>
+              <a:t>gaps between </a:t>
+            </a:r>
+            <a:r>
+              <a:rPr lang="en-US" altLang="zh-CN"/>
+              <a:t>the backward evaluation in stage two mentioned before </a:t>
+            </a:r>
+            <a:r>
+              <a:rPr lang="en-US" altLang="zh-CN" b="1"/>
+              <a:t>and </a:t>
+            </a:r>
+            <a:r>
+              <a:rPr lang="en-US" altLang="zh-CN"/>
+              <a:t>the </a:t>
             </a:r>
             <a:r>
               <a:rPr lang="en-US" altLang="zh-CN">
                 <a:sym typeface="+mn-ea"/>
               </a:rPr>
-              <a:t> (e.g., restrict the flexibility when modifying list and only modify value currently).</a:t>
-            </a:r>
-            <a:endParaRPr lang="en-US" altLang="zh-CN">
-              <a:sym typeface="+mn-ea"/>
-            </a:endParaRPr>
+              <a:t>backward evaluation semantics </a:t>
+            </a:r>
+            <a:r>
+              <a:rPr lang="en-US" altLang="zh-CN"/>
+              <a:t>in OOPSLA’18 </a:t>
+            </a:r>
+            <a:r>
+              <a:rPr lang="en-US" altLang="zh-CN" b="1"/>
+              <a:t>when </a:t>
+            </a:r>
+            <a:r>
+              <a:rPr lang="en-US" altLang="zh-CN"/>
+              <a:t>multiple functions operating on list compose which the structural information gets lost, and </a:t>
+            </a:r>
+            <a:r>
+              <a:rPr lang="en-US" altLang="zh-CN" b="1"/>
+              <a:t>find an </a:t>
+            </a:r>
+            <a:r>
+              <a:rPr lang="en-US" altLang="zh-CN"/>
+              <a:t>ad-hoc </a:t>
+            </a:r>
+            <a:r>
+              <a:rPr lang="en-US" altLang="zh-CN" b="1"/>
+              <a:t>solution</a:t>
+            </a:r>
+            <a:endParaRPr lang="en-US" altLang="zh-CN"/>
           </a:p>
           <a:p>
             <a:pPr marL="514350" indent="-514350">
               <a:buAutoNum type="arabicPeriod"/>
             </a:pPr>
-            <a:r>
-              <a:rPr lang="en-US" altLang="zh-CN">
-                <a:sym typeface="+mn-ea"/>
-              </a:rPr>
-              <a:t>Implement it by </a:t>
-            </a:r>
-            <a:r>
-              <a:rPr lang="en-US" altLang="zh-CN" b="1">
-                <a:sym typeface="+mn-ea"/>
-              </a:rPr>
-              <a:t>coding</a:t>
-            </a:r>
-            <a:r>
-              <a:rPr lang="en-US" altLang="zh-CN">
-                <a:sym typeface="+mn-ea"/>
-              </a:rPr>
-              <a:t>.</a:t>
-            </a:r>
-            <a:endParaRPr lang="en-US" altLang="zh-CN">
-              <a:sym typeface="+mn-ea"/>
-            </a:endParaRPr>
+            <a:endParaRPr lang="en-US" altLang="zh-CN"/>
           </a:p>
           <a:p>
             <a:pPr marL="514350" indent="-514350">
               <a:buAutoNum type="arabicPeriod"/>
             </a:pPr>
-            <a:endParaRPr lang="en-US" altLang="zh-CN">
-              <a:sym typeface="+mn-ea"/>
-            </a:endParaRPr>
-          </a:p>
-          <a:p>
-            <a:pPr marL="514350" indent="-514350">
-              <a:buAutoNum type="arabicPeriod"/>
-            </a:pPr>
-            <a:endParaRPr lang="en-US" altLang="zh-CN">
-              <a:sym typeface="+mn-ea"/>
-            </a:endParaRPr>
-          </a:p>
-          <a:p>
             <a:endParaRPr lang="en-US" altLang="zh-CN"/>
           </a:p>
         </p:txBody>
@@ -6469,7 +6950,7 @@
           <a:p>
             <a:r>
               <a:rPr lang="en-US" altLang="zh-CN"/>
-              <a:t>Question</a:t>
+              <a:t>Next Plan</a:t>
             </a:r>
             <a:endParaRPr lang="en-US" altLang="zh-CN"/>
           </a:p>
@@ -6493,19 +6974,138 @@
               <a:buAutoNum type="arabicPeriod"/>
             </a:pPr>
             <a:r>
+              <a:rPr lang="en-US" altLang="zh-CN" b="1"/>
+              <a:t>Make a summary</a:t>
+            </a:r>
+            <a:r>
               <a:rPr lang="en-US" altLang="zh-CN"/>
-              <a:t>Does innovation matter in bachelor thesis?</a:t>
-            </a:r>
-            <a:endParaRPr lang="en-US" altLang="zh-CN"/>
+              <a:t> of the core </a:t>
+            </a:r>
+            <a:r>
+              <a:rPr lang="en-US" altLang="zh-CN" b="1"/>
+              <a:t>syntax </a:t>
+            </a:r>
+            <a:r>
+              <a:rPr lang="en-US" altLang="zh-CN"/>
+              <a:t>and </a:t>
+            </a:r>
+            <a:r>
+              <a:rPr lang="en-US" altLang="zh-CN" b="1"/>
+              <a:t>semantics </a:t>
+            </a:r>
+            <a:r>
+              <a:rPr lang="en-US" altLang="zh-CN"/>
+              <a:t>of the document calculi - </a:t>
+            </a:r>
+            <a:r>
+              <a:rPr lang="en-US" altLang="zh-CN" i="1"/>
+              <a:t>Article Template Program.</a:t>
+            </a:r>
+            <a:endParaRPr lang="en-US" altLang="zh-CN" i="1"/>
           </a:p>
           <a:p>
             <a:pPr marL="514350" indent="-514350">
               <a:buAutoNum type="arabicPeriod"/>
             </a:pPr>
             <a:r>
+              <a:rPr lang="en-US" altLang="zh-CN" b="1"/>
+              <a:t>Find more</a:t>
+            </a:r>
+            <a:r>
               <a:rPr lang="en-US" altLang="zh-CN"/>
-              <a:t>Deadline of bachelor thesis and artifact?</a:t>
-            </a:r>
+              <a:t> examples that cover every primitive operations and perform backward evaluation using the </a:t>
+            </a:r>
+            <a:r>
+              <a:rPr lang="en-US" altLang="zh-CN">
+                <a:sym typeface="+mn-ea"/>
+              </a:rPr>
+              <a:t>backward evaluation semantics </a:t>
+            </a:r>
+            <a:r>
+              <a:rPr lang="en-US" altLang="zh-CN">
+                <a:sym typeface="+mn-ea"/>
+              </a:rPr>
+              <a:t>in OOPSLA’18 to find more </a:t>
+            </a:r>
+            <a:r>
+              <a:rPr lang="en-US" altLang="zh-CN" b="1">
+                <a:sym typeface="+mn-ea"/>
+              </a:rPr>
+              <a:t>gaps</a:t>
+            </a:r>
+            <a:r>
+              <a:rPr lang="en-US" altLang="zh-CN">
+                <a:sym typeface="+mn-ea"/>
+              </a:rPr>
+              <a:t>.</a:t>
+            </a:r>
+            <a:endParaRPr lang="en-US" altLang="zh-CN">
+              <a:sym typeface="+mn-ea"/>
+            </a:endParaRPr>
+          </a:p>
+          <a:p>
+            <a:pPr marL="514350" indent="-514350">
+              <a:buAutoNum type="arabicPeriod"/>
+            </a:pPr>
+            <a:r>
+              <a:rPr lang="en-US" altLang="zh-CN" b="1">
+                <a:sym typeface="+mn-ea"/>
+              </a:rPr>
+              <a:t>Fill the gaps using general solution</a:t>
+            </a:r>
+            <a:r>
+              <a:rPr lang="en-US" altLang="zh-CN">
+                <a:sym typeface="+mn-ea"/>
+              </a:rPr>
+              <a:t> (e.g., restrict the flexibility when modifying list and only modify value currently).</a:t>
+            </a:r>
+            <a:endParaRPr lang="en-US" altLang="zh-CN">
+              <a:sym typeface="+mn-ea"/>
+            </a:endParaRPr>
+          </a:p>
+          <a:p>
+            <a:pPr marL="514350" indent="-514350">
+              <a:buAutoNum type="arabicPeriod"/>
+            </a:pPr>
+            <a:r>
+              <a:rPr lang="en-US" altLang="zh-CN">
+                <a:sym typeface="+mn-ea"/>
+              </a:rPr>
+              <a:t>Implement it by </a:t>
+            </a:r>
+            <a:r>
+              <a:rPr lang="en-US" altLang="zh-CN" b="1">
+                <a:sym typeface="+mn-ea"/>
+              </a:rPr>
+              <a:t>coding</a:t>
+            </a:r>
+            <a:r>
+              <a:rPr lang="en-US" altLang="zh-CN">
+                <a:sym typeface="+mn-ea"/>
+              </a:rPr>
+              <a:t>.</a:t>
+            </a:r>
+            <a:endParaRPr lang="en-US" altLang="zh-CN">
+              <a:sym typeface="+mn-ea"/>
+            </a:endParaRPr>
+          </a:p>
+          <a:p>
+            <a:pPr marL="514350" indent="-514350">
+              <a:buAutoNum type="arabicPeriod"/>
+            </a:pPr>
+            <a:endParaRPr lang="en-US" altLang="zh-CN">
+              <a:sym typeface="+mn-ea"/>
+            </a:endParaRPr>
+          </a:p>
+          <a:p>
+            <a:pPr marL="514350" indent="-514350">
+              <a:buAutoNum type="arabicPeriod"/>
+            </a:pPr>
+            <a:endParaRPr lang="en-US" altLang="zh-CN">
+              <a:sym typeface="+mn-ea"/>
+            </a:endParaRPr>
+          </a:p>
+          <a:p>
             <a:endParaRPr lang="en-US" altLang="zh-CN"/>
           </a:p>
         </p:txBody>
@@ -6518,7 +7118,7 @@
 </p:sld>
 </file>
 
-<file path=ppt/slides/slide3.xml><?xml version="1.0" encoding="utf-8"?>
+<file path=ppt/slides/slide22.xml><?xml version="1.0" encoding="utf-8"?>
 <p:sld xmlns:a="http://schemas.openxmlformats.org/drawingml/2006/main" xmlns:r="http://schemas.openxmlformats.org/officeDocument/2006/relationships" xmlns:p="http://schemas.openxmlformats.org/presentationml/2006/main">
   <p:cSld>
     <p:spTree>
@@ -6544,7 +7144,7 @@
           <a:p>
             <a:r>
               <a:rPr lang="en-US" altLang="zh-CN"/>
-              <a:t>Preliminaries</a:t>
+              <a:t>Question</a:t>
             </a:r>
             <a:endParaRPr lang="en-US" altLang="zh-CN"/>
           </a:p>
@@ -6564,84 +7164,850 @@
         <p:txBody>
           <a:bodyPr/>
           <a:p>
+            <a:pPr marL="514350" indent="-514350">
+              <a:buAutoNum type="arabicPeriod"/>
+            </a:pPr>
             <a:r>
               <a:rPr lang="en-US" altLang="zh-CN"/>
-              <a:t>Bidirectional Transformation (BX)</a:t>
+              <a:t>Does innovation matter in bachelor thesis?</a:t>
             </a:r>
             <a:endParaRPr lang="en-US" altLang="zh-CN"/>
           </a:p>
           <a:p>
+            <a:pPr marL="514350" indent="-514350">
+              <a:buAutoNum type="arabicPeriod"/>
+            </a:pPr>
+            <a:r>
+              <a:rPr lang="en-US" altLang="zh-CN"/>
+              <a:t>Deadline of bachelor thesis and artifact?</a:t>
+            </a:r>
+            <a:endParaRPr lang="en-US" altLang="zh-CN"/>
+          </a:p>
+        </p:txBody>
+      </p:sp>
+    </p:spTree>
+  </p:cSld>
+  <p:clrMapOvr>
+    <a:masterClrMapping/>
+  </p:clrMapOvr>
+</p:sld>
+</file>
+
+<file path=ppt/slides/slide23.xml><?xml version="1.0" encoding="utf-8"?>
+<p:sld xmlns:a="http://schemas.openxmlformats.org/drawingml/2006/main" xmlns:r="http://schemas.openxmlformats.org/officeDocument/2006/relationships" xmlns:p="http://schemas.openxmlformats.org/presentationml/2006/main">
+  <p:cSld>
+    <p:spTree>
+      <p:nvGrpSpPr>
+        <p:cNvPr id="1" name=""/>
+        <p:cNvGrpSpPr/>
+        <p:nvPr/>
+      </p:nvGrpSpPr>
+      <p:grpSpPr/>
+      <p:sp>
+        <p:nvSpPr>
+          <p:cNvPr id="2" name="标题 1"/>
+          <p:cNvSpPr>
+            <a:spLocks noGrp="1"/>
+          </p:cNvSpPr>
+          <p:nvPr>
+            <p:ph type="ctrTitle"/>
+          </p:nvPr>
+        </p:nvSpPr>
+        <p:spPr/>
+        <p:txBody>
+          <a:bodyPr/>
+          <a:p>
+            <a:r>
+              <a:rPr lang="en-US" altLang="zh-CN"/>
+              <a:t>2</a:t>
+            </a:r>
+            <a:endParaRPr lang="en-US" altLang="zh-CN"/>
+          </a:p>
+        </p:txBody>
+      </p:sp>
+      <p:sp>
+        <p:nvSpPr>
+          <p:cNvPr id="3" name="副标题 2"/>
+          <p:cNvSpPr>
+            <a:spLocks noGrp="1"/>
+          </p:cNvSpPr>
+          <p:nvPr>
+            <p:ph type="subTitle" idx="1"/>
+          </p:nvPr>
+        </p:nvSpPr>
+        <p:spPr/>
+        <p:txBody>
+          <a:bodyPr/>
+          <a:p>
+            <a:r>
+              <a:rPr lang="en-US" altLang="zh-CN">
+                <a:sym typeface="+mn-ea"/>
+              </a:rPr>
+              <a:t>2024.03.22</a:t>
+            </a:r>
+            <a:endParaRPr lang="zh-CN" altLang="en-US"/>
+          </a:p>
+        </p:txBody>
+      </p:sp>
+    </p:spTree>
+  </p:cSld>
+  <p:clrMapOvr>
+    <a:masterClrMapping/>
+  </p:clrMapOvr>
+</p:sld>
+</file>
+
+<file path=ppt/slides/slide24.xml><?xml version="1.0" encoding="utf-8"?>
+<p:sld xmlns:a="http://schemas.openxmlformats.org/drawingml/2006/main" xmlns:r="http://schemas.openxmlformats.org/officeDocument/2006/relationships" xmlns:p="http://schemas.openxmlformats.org/presentationml/2006/main">
+  <p:cSld>
+    <p:spTree>
+      <p:nvGrpSpPr>
+        <p:cNvPr id="1" name=""/>
+        <p:cNvGrpSpPr/>
+        <p:nvPr/>
+      </p:nvGrpSpPr>
+      <p:grpSpPr/>
+      <p:sp>
+        <p:nvSpPr>
+          <p:cNvPr id="2" name="标题 1"/>
+          <p:cNvSpPr>
+            <a:spLocks noGrp="1"/>
+          </p:cNvSpPr>
+          <p:nvPr>
+            <p:ph type="title"/>
+          </p:nvPr>
+        </p:nvSpPr>
+        <p:spPr/>
+        <p:txBody>
+          <a:bodyPr/>
+          <a:p>
+            <a:r>
+              <a:rPr lang="en-US" altLang="zh-CN"/>
+              <a:t>Changes to Overall Plan</a:t>
+            </a:r>
+            <a:endParaRPr lang="en-US" altLang="zh-CN"/>
+          </a:p>
+        </p:txBody>
+      </p:sp>
+      <p:sp>
+        <p:nvSpPr>
+          <p:cNvPr id="3" name="内容占位符 2"/>
+          <p:cNvSpPr>
+            <a:spLocks noGrp="1"/>
+          </p:cNvSpPr>
+          <p:nvPr>
+            <p:ph idx="1"/>
+          </p:nvPr>
+        </p:nvSpPr>
+        <p:spPr/>
+        <p:txBody>
+          <a:bodyPr>
+            <a:normAutofit/>
+          </a:bodyPr>
+          <a:p>
+            <a:pPr marL="514350" indent="-514350">
+              <a:buAutoNum type="arabicPeriod"/>
+            </a:pPr>
+            <a:r>
+              <a:rPr lang="en-US" altLang="zh-CN" sz="2800" b="1">
+                <a:sym typeface="+mn-ea"/>
+              </a:rPr>
+              <a:t>Make a summary</a:t>
+            </a:r>
+            <a:r>
+              <a:rPr lang="en-US" altLang="zh-CN" sz="2800">
+                <a:sym typeface="+mn-ea"/>
+              </a:rPr>
+              <a:t> of the core </a:t>
+            </a:r>
+            <a:r>
+              <a:rPr lang="en-US" altLang="zh-CN" sz="2800" b="1">
+                <a:sym typeface="+mn-ea"/>
+              </a:rPr>
+              <a:t>syntax </a:t>
+            </a:r>
+            <a:r>
+              <a:rPr lang="en-US" altLang="zh-CN" sz="2800">
+                <a:sym typeface="+mn-ea"/>
+              </a:rPr>
+              <a:t>and </a:t>
+            </a:r>
+            <a:r>
+              <a:rPr lang="en-US" altLang="zh-CN" sz="2800" b="1">
+                <a:sym typeface="+mn-ea"/>
+              </a:rPr>
+              <a:t>semantics </a:t>
+            </a:r>
+            <a:r>
+              <a:rPr lang="en-US" altLang="zh-CN" sz="2800">
+                <a:sym typeface="+mn-ea"/>
+              </a:rPr>
+              <a:t>of the document calculi - </a:t>
+            </a:r>
+            <a:r>
+              <a:rPr lang="en-US" altLang="zh-CN" sz="2800" i="1">
+                <a:sym typeface="+mn-ea"/>
+              </a:rPr>
+              <a:t>Article Template Program.</a:t>
+            </a:r>
+            <a:endParaRPr lang="en-US" altLang="zh-CN" sz="2800" i="1"/>
+          </a:p>
+          <a:p>
+            <a:pPr marL="514350" indent="-514350">
+              <a:buAutoNum type="arabicPeriod"/>
+            </a:pPr>
+            <a:r>
+              <a:rPr lang="en-US" altLang="zh-CN" sz="2800">
+                <a:sym typeface="+mn-ea"/>
+              </a:rPr>
+              <a:t>Extend the existing BLP system (Bidirectional Preview) to support templates, which enables content modification of </a:t>
+            </a:r>
+            <a:r>
+              <a:rPr lang="en-US" altLang="zh-CN" sz="2800" b="1" i="1">
+                <a:sym typeface="+mn-ea"/>
+              </a:rPr>
+              <a:t>list</a:t>
+            </a:r>
+            <a:endParaRPr lang="en-US" altLang="zh-CN" sz="2800"/>
+          </a:p>
+          <a:p>
+            <a:pPr marL="514350" indent="-514350">
+              <a:buAutoNum type="arabicPeriod"/>
+            </a:pPr>
+            <a:r>
+              <a:rPr lang="en-US" altLang="zh-CN" sz="2800">
+                <a:sym typeface="+mn-ea"/>
+              </a:rPr>
+              <a:t>Extend the current system with the ability of structural modification of </a:t>
+            </a:r>
+            <a:r>
+              <a:rPr lang="en-US" altLang="zh-CN" sz="2800" b="1" i="1">
+                <a:sym typeface="+mn-ea"/>
+              </a:rPr>
+              <a:t>list</a:t>
+            </a:r>
+            <a:endParaRPr lang="en-US" altLang="zh-CN" sz="2800" b="1" i="1">
+              <a:sym typeface="+mn-ea"/>
+            </a:endParaRPr>
+          </a:p>
+          <a:p>
+            <a:pPr marL="914400" lvl="1" indent="-457200">
+              <a:buAutoNum type="arabicPeriod"/>
+            </a:pPr>
+            <a:r>
+              <a:rPr lang="en-US" altLang="zh-CN" sz="2055" b="1">
+                <a:sym typeface="+mn-ea"/>
+              </a:rPr>
+              <a:t>Find more</a:t>
+            </a:r>
+            <a:r>
+              <a:rPr lang="en-US" altLang="zh-CN" sz="2055">
+                <a:sym typeface="+mn-ea"/>
+              </a:rPr>
+              <a:t> examples that cover every primitive operations and perform backward evaluation using the </a:t>
+            </a:r>
+            <a:r>
+              <a:rPr lang="en-US" altLang="zh-CN" sz="2055">
+                <a:sym typeface="+mn-ea"/>
+              </a:rPr>
+              <a:t>backward evaluation semantics in OOPSLA’18 to find more </a:t>
+            </a:r>
+            <a:r>
+              <a:rPr lang="en-US" altLang="zh-CN" sz="2055" b="1">
+                <a:sym typeface="+mn-ea"/>
+              </a:rPr>
+              <a:t>gaps</a:t>
+            </a:r>
+            <a:r>
+              <a:rPr lang="en-US" altLang="zh-CN" sz="2055">
+                <a:sym typeface="+mn-ea"/>
+              </a:rPr>
+              <a:t>.</a:t>
+            </a:r>
+            <a:endParaRPr lang="en-US" altLang="zh-CN" sz="2055">
+              <a:sym typeface="+mn-ea"/>
+            </a:endParaRPr>
+          </a:p>
+          <a:p>
+            <a:pPr marL="914400" lvl="1" indent="-457200">
+              <a:buAutoNum type="arabicPeriod"/>
+            </a:pPr>
+            <a:r>
+              <a:rPr lang="en-US" altLang="zh-CN" sz="2055" b="1">
+                <a:sym typeface="+mn-ea"/>
+              </a:rPr>
+              <a:t>Fill the gaps using general solution</a:t>
+            </a:r>
+            <a:r>
+              <a:rPr lang="en-US" altLang="zh-CN" sz="2055">
+                <a:sym typeface="+mn-ea"/>
+              </a:rPr>
+              <a:t> (e.g., restrict the flexibility when modifying list and only modify value currently).</a:t>
+            </a:r>
+            <a:endParaRPr lang="en-US" altLang="zh-CN" sz="2055">
+              <a:sym typeface="+mn-ea"/>
+            </a:endParaRPr>
+          </a:p>
+          <a:p>
+            <a:pPr marL="914400" lvl="1" indent="-457200">
+              <a:buAutoNum type="arabicPeriod"/>
+            </a:pPr>
+            <a:r>
+              <a:rPr lang="en-US" altLang="zh-CN" sz="2055">
+                <a:sym typeface="+mn-ea"/>
+              </a:rPr>
+              <a:t>Implement it by </a:t>
+            </a:r>
+            <a:r>
+              <a:rPr lang="en-US" altLang="zh-CN" sz="2055" b="1">
+                <a:sym typeface="+mn-ea"/>
+              </a:rPr>
+              <a:t>coding</a:t>
+            </a:r>
+            <a:r>
+              <a:rPr lang="en-US" altLang="zh-CN" sz="2055">
+                <a:sym typeface="+mn-ea"/>
+              </a:rPr>
+              <a:t>.</a:t>
+            </a:r>
+            <a:endParaRPr lang="en-US" altLang="zh-CN" sz="2055">
+              <a:sym typeface="+mn-ea"/>
+            </a:endParaRPr>
+          </a:p>
+          <a:p>
             <a:pPr lvl="1"/>
+            <a:endParaRPr lang="en-US" altLang="zh-CN" sz="2400" b="1" i="1"/>
+          </a:p>
+          <a:p>
+            <a:endParaRPr lang="zh-CN" altLang="en-US"/>
+          </a:p>
+        </p:txBody>
+      </p:sp>
+    </p:spTree>
+  </p:cSld>
+  <p:clrMapOvr>
+    <a:masterClrMapping/>
+  </p:clrMapOvr>
+</p:sld>
+</file>
+
+<file path=ppt/slides/slide25.xml><?xml version="1.0" encoding="utf-8"?>
+<p:sld xmlns:a="http://schemas.openxmlformats.org/drawingml/2006/main" xmlns:r="http://schemas.openxmlformats.org/officeDocument/2006/relationships" xmlns:p="http://schemas.openxmlformats.org/presentationml/2006/main">
+  <p:cSld>
+    <p:spTree>
+      <p:nvGrpSpPr>
+        <p:cNvPr id="1" name=""/>
+        <p:cNvGrpSpPr/>
+        <p:nvPr/>
+      </p:nvGrpSpPr>
+      <p:grpSpPr/>
+      <p:sp>
+        <p:nvSpPr>
+          <p:cNvPr id="2" name="标题 1"/>
+          <p:cNvSpPr>
+            <a:spLocks noGrp="1"/>
+          </p:cNvSpPr>
+          <p:nvPr>
+            <p:ph type="title"/>
+          </p:nvPr>
+        </p:nvSpPr>
+        <p:spPr/>
+        <p:txBody>
+          <a:bodyPr/>
+          <a:p>
             <a:r>
               <a:rPr lang="en-US" altLang="zh-CN"/>
-              <a:t>Bidirectional Programming Language (Lenses) </a:t>
+              <a:t>Progress</a:t>
             </a:r>
             <a:endParaRPr lang="en-US" altLang="zh-CN"/>
           </a:p>
-          <a:p>
-            <a:pPr lvl="1"/>
+        </p:txBody>
+      </p:sp>
+      <p:sp>
+        <p:nvSpPr>
+          <p:cNvPr id="3" name="内容占位符 2"/>
+          <p:cNvSpPr>
+            <a:spLocks noGrp="1"/>
+          </p:cNvSpPr>
+          <p:nvPr>
+            <p:ph idx="1"/>
+          </p:nvPr>
+        </p:nvSpPr>
+        <p:spPr>
+          <a:xfrm>
+            <a:off x="838200" y="1825625"/>
+            <a:ext cx="10515600" cy="4877435"/>
+          </a:xfrm>
+        </p:spPr>
+        <p:txBody>
+          <a:bodyPr>
+            <a:normAutofit fontScale="90000"/>
+          </a:bodyPr>
+          <a:p>
+            <a:pPr marL="514350" indent="-514350">
+              <a:buAutoNum type="arabicPeriod"/>
+            </a:pPr>
+            <a:r>
+              <a:rPr lang="en-US" altLang="zh-CN" sz="3000" b="1">
+                <a:sym typeface="+mn-ea"/>
+              </a:rPr>
+              <a:t>Make a summary</a:t>
+            </a:r>
+            <a:r>
+              <a:rPr lang="en-US" altLang="zh-CN" sz="3000">
+                <a:sym typeface="+mn-ea"/>
+              </a:rPr>
+              <a:t> of the core </a:t>
+            </a:r>
+            <a:r>
+              <a:rPr lang="en-US" altLang="zh-CN" sz="3000" b="1">
+                <a:sym typeface="+mn-ea"/>
+              </a:rPr>
+              <a:t>syntax </a:t>
+            </a:r>
+            <a:r>
+              <a:rPr lang="en-US" altLang="zh-CN" sz="3000">
+                <a:sym typeface="+mn-ea"/>
+              </a:rPr>
+              <a:t>and </a:t>
+            </a:r>
+            <a:r>
+              <a:rPr lang="en-US" altLang="zh-CN" sz="3000" b="1">
+                <a:sym typeface="+mn-ea"/>
+              </a:rPr>
+              <a:t>semantics </a:t>
+            </a:r>
+            <a:r>
+              <a:rPr lang="en-US" altLang="zh-CN" sz="3000">
+                <a:sym typeface="+mn-ea"/>
+              </a:rPr>
+              <a:t>of the document calculi - </a:t>
+            </a:r>
+            <a:r>
+              <a:rPr lang="en-US" altLang="zh-CN" sz="3000" i="1">
+                <a:sym typeface="+mn-ea"/>
+              </a:rPr>
+              <a:t>Article Template Program.</a:t>
+            </a:r>
+            <a:endParaRPr lang="en-US" altLang="zh-CN" sz="3000" i="1">
+              <a:sym typeface="+mn-ea"/>
+            </a:endParaRPr>
+          </a:p>
+          <a:p>
+            <a:pPr marL="514350" indent="-514350">
+              <a:buAutoNum type="arabicPeriod"/>
+            </a:pPr>
+            <a:r>
+              <a:rPr lang="en-US" altLang="zh-CN" sz="3000">
+                <a:sym typeface="+mn-ea"/>
+              </a:rPr>
+              <a:t>Extend the existing BLP system (Bidirectional Preview) to support templates, which enables content modification of </a:t>
+            </a:r>
+            <a:r>
+              <a:rPr lang="en-US" altLang="zh-CN" sz="3000" b="1" i="1">
+                <a:sym typeface="+mn-ea"/>
+              </a:rPr>
+              <a:t>list</a:t>
+            </a:r>
+            <a:endParaRPr lang="en-US" altLang="zh-CN" sz="3000" b="1" i="1">
+              <a:sym typeface="+mn-ea"/>
+            </a:endParaRPr>
+          </a:p>
+          <a:p>
+            <a:pPr marL="971550" lvl="1" indent="-514350">
+              <a:buAutoNum type="arabicPeriod"/>
+            </a:pPr>
+            <a:r>
+              <a:rPr lang="en-US" altLang="zh-CN" sz="2055">
+                <a:sym typeface="+mn-ea"/>
+              </a:rPr>
+              <a:t>Read the source code of Bidirectional Preview.	</a:t>
+            </a:r>
+            <a:r>
+              <a:rPr lang="en-US" altLang="zh-CN" sz="2055" b="1">
+                <a:solidFill>
+                  <a:srgbClr val="00B050"/>
+                </a:solidFill>
+                <a:sym typeface="+mn-ea"/>
+              </a:rPr>
+              <a:t>Done.</a:t>
+            </a:r>
+            <a:endParaRPr lang="en-US" altLang="zh-CN" sz="2055"/>
+          </a:p>
+          <a:p>
+            <a:pPr marL="971550" lvl="1" indent="-514350">
+              <a:buAutoNum type="arabicPeriod"/>
+            </a:pPr>
+            <a:r>
+              <a:rPr lang="en-US" altLang="zh-CN" sz="2055">
+                <a:sym typeface="+mn-ea"/>
+              </a:rPr>
+              <a:t>Remove all the hole out of it.		</a:t>
+            </a:r>
+            <a:r>
+              <a:rPr lang="en-US" altLang="zh-CN" sz="2055" b="1">
+                <a:solidFill>
+                  <a:srgbClr val="00B050"/>
+                </a:solidFill>
+                <a:sym typeface="+mn-ea"/>
+              </a:rPr>
+              <a:t>Done.</a:t>
+            </a:r>
+            <a:endParaRPr lang="en-US" altLang="zh-CN" sz="2055"/>
+          </a:p>
+          <a:p>
+            <a:pPr marL="971550" lvl="1" indent="-514350">
+              <a:buAutoNum type="arabicPeriod"/>
+            </a:pPr>
+            <a:r>
+              <a:rPr lang="en-US" altLang="zh-CN" sz="2055">
+                <a:sym typeface="+mn-ea"/>
+              </a:rPr>
+              <a:t>Add concatenation of string.			</a:t>
+            </a:r>
+            <a:r>
+              <a:rPr lang="en-US" altLang="zh-CN" sz="2055" b="1">
+                <a:solidFill>
+                  <a:srgbClr val="00B050"/>
+                </a:solidFill>
+                <a:sym typeface="+mn-ea"/>
+              </a:rPr>
+              <a:t>Done.</a:t>
+            </a:r>
+            <a:endParaRPr lang="en-US" altLang="zh-CN" sz="2055">
+              <a:sym typeface="+mn-ea"/>
+            </a:endParaRPr>
+          </a:p>
+          <a:p>
+            <a:pPr marL="971550" lvl="1" indent="-514350">
+              <a:buAutoNum type="arabicPeriod"/>
+            </a:pPr>
+            <a:r>
+              <a:rPr lang="en-US" altLang="zh-CN" sz="2000">
+                <a:sym typeface="+mn-ea"/>
+              </a:rPr>
+              <a:t>Add Forward - String Template.		</a:t>
+            </a:r>
+            <a:r>
+              <a:rPr lang="en-US" altLang="zh-CN" sz="2000" b="1">
+                <a:solidFill>
+                  <a:srgbClr val="FF0000"/>
+                </a:solidFill>
+                <a:sym typeface="+mn-ea"/>
+              </a:rPr>
+              <a:t>Doing.</a:t>
+            </a:r>
+            <a:endParaRPr lang="en-US" altLang="zh-CN" sz="2000"/>
+          </a:p>
+          <a:p>
+            <a:pPr lvl="2"/>
+            <a:r>
+              <a:rPr lang="en-US" altLang="zh-CN" sz="2000" b="1">
+                <a:solidFill>
+                  <a:srgbClr val="00B050"/>
+                </a:solidFill>
+                <a:sym typeface="+mn-ea"/>
+              </a:rPr>
+              <a:t>Syntax </a:t>
+            </a:r>
+            <a:r>
+              <a:rPr lang="en-US" altLang="zh-CN" sz="2000">
+                <a:sym typeface="+mn-ea"/>
+              </a:rPr>
+              <a:t>&amp; </a:t>
+            </a:r>
+            <a:r>
+              <a:rPr lang="en-US" altLang="zh-CN" sz="2000" b="1">
+                <a:solidFill>
+                  <a:srgbClr val="FFC000"/>
+                </a:solidFill>
+                <a:sym typeface="+mn-ea"/>
+              </a:rPr>
+              <a:t>Parser</a:t>
+            </a:r>
+            <a:endParaRPr lang="en-US" altLang="zh-CN" sz="2000"/>
+          </a:p>
+          <a:p>
+            <a:pPr lvl="2"/>
+            <a:r>
+              <a:rPr lang="en-US" altLang="zh-CN" sz="2000" b="1">
+                <a:solidFill>
+                  <a:srgbClr val="FF0000"/>
+                </a:solidFill>
+                <a:sym typeface="+mn-ea"/>
+              </a:rPr>
+              <a:t>Desugar</a:t>
+            </a:r>
+            <a:endParaRPr lang="en-US" altLang="zh-CN" sz="2000" b="1">
+              <a:solidFill>
+                <a:srgbClr val="FF0000"/>
+              </a:solidFill>
+            </a:endParaRPr>
+          </a:p>
+          <a:p>
+            <a:pPr marL="971550" lvl="1" indent="-514350">
+              <a:buAutoNum type="arabicPeriod"/>
+            </a:pPr>
+            <a:r>
+              <a:rPr lang="en-US" altLang="zh-CN" sz="2000">
+                <a:sym typeface="+mn-ea"/>
+              </a:rPr>
+              <a:t>Add Backward - String Template.		</a:t>
+            </a:r>
+            <a:r>
+              <a:rPr lang="en-US" altLang="zh-CN" sz="2000" b="1">
+                <a:solidFill>
+                  <a:srgbClr val="FFC000"/>
+                </a:solidFill>
+                <a:sym typeface="+mn-ea"/>
+              </a:rPr>
+              <a:t>Not Start</a:t>
+            </a:r>
+            <a:endParaRPr lang="en-US" altLang="zh-CN" sz="2000"/>
+          </a:p>
+          <a:p>
+            <a:pPr marL="971550" lvl="1" indent="-514350">
+              <a:buAutoNum type="arabicPeriod"/>
+            </a:pPr>
+            <a:r>
+              <a:rPr lang="en-US" altLang="zh-CN" sz="2000">
+                <a:sym typeface="+mn-ea"/>
+              </a:rPr>
+              <a:t>Add Forward &amp; Backward - Article Template.	</a:t>
+            </a:r>
+            <a:r>
+              <a:rPr lang="en-US" altLang="zh-CN" sz="2000" b="1">
+                <a:solidFill>
+                  <a:srgbClr val="FFC000"/>
+                </a:solidFill>
+                <a:sym typeface="+mn-ea"/>
+              </a:rPr>
+              <a:t>Not Start</a:t>
+            </a:r>
+            <a:endParaRPr lang="en-US" altLang="zh-CN" sz="2000">
+              <a:solidFill>
+                <a:srgbClr val="FFC000"/>
+              </a:solidFill>
+            </a:endParaRPr>
+          </a:p>
+          <a:p>
+            <a:pPr marL="971550" lvl="1" indent="-514350">
+              <a:buAutoNum type="arabicPeriod"/>
+            </a:pPr>
+            <a:r>
+              <a:rPr lang="en-US" altLang="zh-CN" sz="2000">
+                <a:sym typeface="+mn-ea"/>
+              </a:rPr>
+              <a:t>Exploring Structural Modification of List.	</a:t>
+            </a:r>
+            <a:r>
+              <a:rPr lang="en-US" altLang="zh-CN" sz="2000" b="1">
+                <a:solidFill>
+                  <a:srgbClr val="FFC000"/>
+                </a:solidFill>
+                <a:sym typeface="+mn-ea"/>
+              </a:rPr>
+              <a:t>Not Start</a:t>
+            </a:r>
+            <a:endParaRPr lang="en-US" altLang="zh-CN" sz="2000"/>
+          </a:p>
+          <a:p>
+            <a:pPr marL="514350" indent="-514350">
+              <a:buAutoNum type="arabicPeriod"/>
+            </a:pPr>
+            <a:endParaRPr lang="en-US" altLang="zh-CN"/>
+          </a:p>
+          <a:p>
+            <a:pPr marL="514350" indent="-514350">
+              <a:buAutoNum type="arabicPeriod"/>
+            </a:pPr>
+            <a:endParaRPr lang="en-US" altLang="zh-CN" b="1" i="1"/>
+          </a:p>
+        </p:txBody>
+      </p:sp>
+      <p:sp>
+        <p:nvSpPr>
+          <p:cNvPr id="4" name="文本框 3"/>
+          <p:cNvSpPr txBox="1"/>
+          <p:nvPr/>
+        </p:nvSpPr>
+        <p:spPr>
+          <a:xfrm>
+            <a:off x="-433070" y="3043555"/>
+            <a:ext cx="4064000" cy="368300"/>
+          </a:xfrm>
+          <a:prstGeom prst="rect">
+            <a:avLst/>
+          </a:prstGeom>
+          <a:noFill/>
+        </p:spPr>
+        <p:txBody>
+          <a:bodyPr wrap="square" rtlCol="0">
+            <a:spAutoFit/>
+          </a:bodyPr>
+          <a:p>
+            <a:endParaRPr lang="zh-CN" altLang="en-US"/>
+          </a:p>
+        </p:txBody>
+      </p:sp>
+    </p:spTree>
+  </p:cSld>
+  <p:clrMapOvr>
+    <a:masterClrMapping/>
+  </p:clrMapOvr>
+</p:sld>
+</file>
+
+<file path=ppt/slides/slide26.xml><?xml version="1.0" encoding="utf-8"?>
+<p:sld xmlns:a="http://schemas.openxmlformats.org/drawingml/2006/main" xmlns:r="http://schemas.openxmlformats.org/officeDocument/2006/relationships" xmlns:p="http://schemas.openxmlformats.org/presentationml/2006/main">
+  <p:cSld>
+    <p:spTree>
+      <p:nvGrpSpPr>
+        <p:cNvPr id="1" name=""/>
+        <p:cNvGrpSpPr/>
+        <p:nvPr/>
+      </p:nvGrpSpPr>
+      <p:grpSpPr/>
+      <p:sp>
+        <p:nvSpPr>
+          <p:cNvPr id="2" name="标题 1"/>
+          <p:cNvSpPr>
+            <a:spLocks noGrp="1"/>
+          </p:cNvSpPr>
+          <p:nvPr>
+            <p:ph type="title"/>
+          </p:nvPr>
+        </p:nvSpPr>
+        <p:spPr/>
+        <p:txBody>
+          <a:bodyPr/>
+          <a:p>
             <a:r>
               <a:rPr lang="en-US" altLang="zh-CN"/>
-              <a:t>Bidirectional Evaluation</a:t>
-            </a:r>
-            <a:endParaRPr lang="en-US" altLang="zh-CN"/>
-          </a:p>
-          <a:p>
-            <a:r>
-              <a:rPr lang="en-US" altLang="zh-CN"/>
-              <a:t>A Core Calculus for Documents</a:t>
-            </a:r>
-            <a:endParaRPr lang="en-US" altLang="zh-CN"/>
-          </a:p>
-          <a:p>
-            <a:pPr lvl="1"/>
-            <a:r>
-              <a:rPr lang="en-US" altLang="zh-CN" sz="2400"/>
-              <a:t>documents &amp; document languages</a:t>
-            </a:r>
-            <a:endParaRPr lang="en-US" altLang="zh-CN" sz="2400"/>
-          </a:p>
-          <a:p>
-            <a:pPr lvl="1"/>
-            <a:r>
-              <a:rPr lang="en-US" altLang="zh-CN"/>
-              <a:t>eight levels formal semantics of document languages (document calculus)</a:t>
-            </a:r>
-            <a:endParaRPr lang="en-US" altLang="zh-CN"/>
-          </a:p>
-          <a:p>
-            <a:pPr lvl="1"/>
-            <a:r>
-              <a:rPr lang="en-US" altLang="zh-CN"/>
-              <a:t>extend it with complex document features, e.g., Reactivity</a:t>
-            </a:r>
-            <a:endParaRPr lang="en-US" altLang="zh-CN"/>
-          </a:p>
-          <a:p>
-            <a:pPr lvl="1"/>
-            <a:endParaRPr lang="en-US" altLang="zh-CN"/>
-          </a:p>
-          <a:p>
-            <a:endParaRPr lang="en-US" altLang="zh-CN"/>
-          </a:p>
-        </p:txBody>
-      </p:sp>
-      <p:sp>
-        <p:nvSpPr>
-          <p:cNvPr id="7" name="右箭头 6">
-            <a:hlinkClick r:id="rId1" tooltip="" action="ppaction://hlinksldjump"/>
-          </p:cNvPr>
+              <a:t>Summary of the syntax - </a:t>
+            </a:r>
+            <a:r>
+              <a:rPr lang="en-US" altLang="zh-CN" sz="2800" i="1"/>
+              <a:t>Article Template Program</a:t>
+            </a:r>
+            <a:endParaRPr lang="en-US" altLang="zh-CN" sz="2800" i="1"/>
+          </a:p>
+        </p:txBody>
+      </p:sp>
+      <p:pic>
+        <p:nvPicPr>
+          <p:cNvPr id="6" name="内容占位符 5"/>
+          <p:cNvPicPr>
+            <a:picLocks noChangeAspect="1"/>
+          </p:cNvPicPr>
+          <p:nvPr>
+            <p:ph idx="1"/>
+            <p:custDataLst>
+              <p:tags r:id="rId1"/>
+            </p:custDataLst>
+          </p:nvPr>
+        </p:nvPicPr>
+        <p:blipFill>
+          <a:blip r:embed="rId2"/>
+          <a:stretch>
+            <a:fillRect/>
+          </a:stretch>
+        </p:blipFill>
+        <p:spPr>
+          <a:xfrm>
+            <a:off x="838200" y="1414780"/>
+            <a:ext cx="2872740" cy="5128260"/>
+          </a:xfrm>
+          <a:prstGeom prst="rect">
+            <a:avLst/>
+          </a:prstGeom>
+        </p:spPr>
+      </p:pic>
+      <p:pic>
+        <p:nvPicPr>
+          <p:cNvPr id="14" name="图片 13"/>
+          <p:cNvPicPr>
+            <a:picLocks noChangeAspect="1"/>
+          </p:cNvPicPr>
+          <p:nvPr>
+            <p:custDataLst>
+              <p:tags r:id="rId3"/>
+            </p:custDataLst>
+          </p:nvPr>
+        </p:nvPicPr>
+        <p:blipFill>
+          <a:blip r:embed="rId4"/>
+          <a:stretch>
+            <a:fillRect/>
+          </a:stretch>
+        </p:blipFill>
+        <p:spPr>
+          <a:xfrm>
+            <a:off x="8293735" y="1489710"/>
+            <a:ext cx="2248535" cy="1506855"/>
+          </a:xfrm>
+          <a:prstGeom prst="rect">
+            <a:avLst/>
+          </a:prstGeom>
+        </p:spPr>
+      </p:pic>
+      <p:pic>
+        <p:nvPicPr>
+          <p:cNvPr id="16" name="图片 15"/>
+          <p:cNvPicPr>
+            <a:picLocks noChangeAspect="1"/>
+          </p:cNvPicPr>
+          <p:nvPr>
+            <p:custDataLst>
+              <p:tags r:id="rId5"/>
+            </p:custDataLst>
+          </p:nvPr>
+        </p:nvPicPr>
+        <p:blipFill>
+          <a:blip r:embed="rId6"/>
+          <a:stretch>
+            <a:fillRect/>
+          </a:stretch>
+        </p:blipFill>
+        <p:spPr>
+          <a:xfrm>
+            <a:off x="4398645" y="1489710"/>
+            <a:ext cx="3029585" cy="1623695"/>
+          </a:xfrm>
+          <a:prstGeom prst="rect">
+            <a:avLst/>
+          </a:prstGeom>
+        </p:spPr>
+      </p:pic>
+      <p:sp>
+        <p:nvSpPr>
+          <p:cNvPr id="20" name="圆角矩形 19"/>
           <p:cNvSpPr/>
           <p:nvPr/>
         </p:nvSpPr>
         <p:spPr>
           <a:xfrm>
-            <a:off x="7364730" y="2355850"/>
-            <a:ext cx="323850" cy="233045"/>
-          </a:xfrm>
-          <a:prstGeom prst="rightArrow">
+            <a:off x="9307830" y="5990590"/>
+            <a:ext cx="2472690" cy="296545"/>
+          </a:xfrm>
+          <a:prstGeom prst="roundRect">
             <a:avLst/>
           </a:prstGeom>
+          <a:noFill/>
+          <a:ln>
+            <a:solidFill>
+              <a:schemeClr val="bg1"/>
+            </a:solidFill>
+          </a:ln>
+          <a:extLst>
+            <a:ext uri="{909E8E84-426E-40DD-AFC4-6F175D3DCCD1}">
+              <a14:hiddenFill xmlns:a14="http://schemas.microsoft.com/office/drawing/2010/main">
+                <a:solidFill>
+                  <a:schemeClr val="accent1"/>
+                </a:solidFill>
+              </a14:hiddenFill>
+            </a:ext>
+          </a:extLst>
         </p:spPr>
         <p:style>
           <a:lnRef idx="2">
@@ -6669,20 +8035,33 @@
       </p:sp>
       <p:sp>
         <p:nvSpPr>
-          <p:cNvPr id="8" name="右箭头 7">
-            <a:hlinkClick r:id="rId2" tooltip="" action="ppaction://hlinksldjump"/>
-          </p:cNvPr>
+          <p:cNvPr id="24" name="圆角矩形 23"/>
           <p:cNvSpPr/>
           <p:nvPr/>
         </p:nvSpPr>
         <p:spPr>
           <a:xfrm>
-            <a:off x="4664075" y="2771140"/>
-            <a:ext cx="323850" cy="233045"/>
-          </a:xfrm>
-          <a:prstGeom prst="rightArrow">
+            <a:off x="9519920" y="6542405"/>
+            <a:ext cx="2261235" cy="276860"/>
+          </a:xfrm>
+          <a:prstGeom prst="roundRect">
             <a:avLst/>
           </a:prstGeom>
+          <a:noFill/>
+          <a:ln>
+            <a:solidFill>
+              <a:schemeClr val="bg1"/>
+            </a:solidFill>
+          </a:ln>
+          <a:extLst>
+            <a:ext uri="{909E8E84-426E-40DD-AFC4-6F175D3DCCD1}">
+              <a14:hiddenFill xmlns:a14="http://schemas.microsoft.com/office/drawing/2010/main">
+                <a:solidFill>
+                  <a:schemeClr val="accent1"/>
+                </a:solidFill>
+              </a14:hiddenFill>
+            </a:ext>
+          </a:extLst>
         </p:spPr>
         <p:style>
           <a:lnRef idx="2">
@@ -6708,17 +8087,955 @@
           </a:p>
         </p:txBody>
       </p:sp>
-      <p:sp>
-        <p:nvSpPr>
-          <p:cNvPr id="9" name="右箭头 8">
-            <a:hlinkClick r:id="rId3" tooltip="" action="ppaction://hlinksldjump"/>
+      <p:pic>
+        <p:nvPicPr>
+          <p:cNvPr id="4" name="图片 3"/>
+          <p:cNvPicPr>
+            <a:picLocks noChangeAspect="1"/>
+          </p:cNvPicPr>
+          <p:nvPr>
+            <p:custDataLst>
+              <p:tags r:id="rId7"/>
+            </p:custDataLst>
+          </p:nvPr>
+        </p:nvPicPr>
+        <p:blipFill>
+          <a:blip r:embed="rId8"/>
+          <a:stretch>
+            <a:fillRect/>
+          </a:stretch>
+        </p:blipFill>
+        <p:spPr>
+          <a:xfrm>
+            <a:off x="4658995" y="3429000"/>
+            <a:ext cx="2419350" cy="1809750"/>
+          </a:xfrm>
+          <a:prstGeom prst="rect">
+            <a:avLst/>
+          </a:prstGeom>
+        </p:spPr>
+      </p:pic>
+    </p:spTree>
+  </p:cSld>
+  <p:clrMapOvr>
+    <a:masterClrMapping/>
+  </p:clrMapOvr>
+  <p:timing>
+    <p:tnLst>
+      <p:par>
+        <p:cTn id="1" dur="indefinite" restart="never" nodeType="tmRoot"/>
+      </p:par>
+    </p:tnLst>
+  </p:timing>
+</p:sld>
+</file>
+
+<file path=ppt/slides/slide27.xml><?xml version="1.0" encoding="utf-8"?>
+<p:sld xmlns:a="http://schemas.openxmlformats.org/drawingml/2006/main" xmlns:r="http://schemas.openxmlformats.org/officeDocument/2006/relationships" xmlns:p="http://schemas.openxmlformats.org/presentationml/2006/main">
+  <p:cSld>
+    <p:spTree>
+      <p:nvGrpSpPr>
+        <p:cNvPr id="1" name=""/>
+        <p:cNvGrpSpPr/>
+        <p:nvPr/>
+      </p:nvGrpSpPr>
+      <p:grpSpPr/>
+      <p:sp>
+        <p:nvSpPr>
+          <p:cNvPr id="2" name="标题 1"/>
+          <p:cNvSpPr>
+            <a:spLocks noGrp="1"/>
+          </p:cNvSpPr>
+          <p:nvPr>
+            <p:ph type="title"/>
+          </p:nvPr>
+        </p:nvSpPr>
+        <p:spPr>
+          <a:xfrm>
+            <a:off x="838200" y="365125"/>
+            <a:ext cx="11172825" cy="1325880"/>
+          </a:xfrm>
+        </p:spPr>
+        <p:txBody>
+          <a:bodyPr>
+            <a:normAutofit/>
+          </a:bodyPr>
+          <a:p>
+            <a:r>
+              <a:rPr lang="en-US" altLang="zh-CN">
+                <a:sym typeface="+mn-ea"/>
+              </a:rPr>
+              <a:t>Summary of the </a:t>
+            </a:r>
+            <a:r>
+              <a:rPr lang="en-US" altLang="zh-CN">
+                <a:sym typeface="+mn-ea"/>
+              </a:rPr>
+              <a:t>semantics - </a:t>
+            </a:r>
+            <a:r>
+              <a:rPr lang="en-US" altLang="zh-CN" sz="3110" i="1">
+                <a:sym typeface="+mn-ea"/>
+              </a:rPr>
+              <a:t>Article Template Program</a:t>
+            </a:r>
+            <a:endParaRPr lang="zh-CN" altLang="en-US" sz="3110"/>
+          </a:p>
+        </p:txBody>
+      </p:sp>
+      <p:grpSp>
+        <p:nvGrpSpPr>
+          <p:cNvPr id="18" name="组合 17"/>
+          <p:cNvGrpSpPr/>
+          <p:nvPr/>
+        </p:nvGrpSpPr>
+        <p:grpSpPr>
+          <a:xfrm>
+            <a:off x="1145540" y="1452733"/>
+            <a:ext cx="9968156" cy="2715176"/>
+            <a:chOff x="970" y="5752"/>
+            <a:chExt cx="17767" cy="4929"/>
+          </a:xfrm>
+        </p:grpSpPr>
+        <p:pic>
+          <p:nvPicPr>
+            <p:cNvPr id="16" name="图片 15"/>
+            <p:cNvPicPr>
+              <a:picLocks noChangeAspect="1"/>
+            </p:cNvPicPr>
+            <p:nvPr>
+              <p:custDataLst>
+                <p:tags r:id="rId1"/>
+              </p:custDataLst>
+            </p:nvPr>
+          </p:nvPicPr>
+          <p:blipFill>
+            <a:blip r:embed="rId2"/>
+            <a:stretch>
+              <a:fillRect/>
+            </a:stretch>
+          </p:blipFill>
+          <p:spPr>
+            <a:xfrm>
+              <a:off x="1764" y="5752"/>
+              <a:ext cx="5880" cy="2850"/>
+            </a:xfrm>
+            <a:prstGeom prst="rect">
+              <a:avLst/>
+            </a:prstGeom>
+          </p:spPr>
+        </p:pic>
+        <p:pic>
+          <p:nvPicPr>
+            <p:cNvPr id="17" name="图片 16"/>
+            <p:cNvPicPr>
+              <a:picLocks noChangeAspect="1"/>
+            </p:cNvPicPr>
+            <p:nvPr>
+              <p:custDataLst>
+                <p:tags r:id="rId3"/>
+              </p:custDataLst>
+            </p:nvPr>
+          </p:nvPicPr>
+          <p:blipFill>
+            <a:blip r:embed="rId4"/>
+            <a:stretch>
+              <a:fillRect/>
+            </a:stretch>
+          </p:blipFill>
+          <p:spPr>
+            <a:xfrm>
+              <a:off x="970" y="8686"/>
+              <a:ext cx="12885" cy="1995"/>
+            </a:xfrm>
+            <a:prstGeom prst="rect">
+              <a:avLst/>
+            </a:prstGeom>
+          </p:spPr>
+        </p:pic>
+        <p:grpSp>
+          <p:nvGrpSpPr>
+            <p:cNvPr id="14" name="组合 13"/>
+            <p:cNvGrpSpPr/>
+            <p:nvPr/>
+          </p:nvGrpSpPr>
+          <p:grpSpPr>
+            <a:xfrm>
+              <a:off x="8812" y="5871"/>
+              <a:ext cx="9925" cy="4238"/>
+              <a:chOff x="985" y="5977"/>
+              <a:chExt cx="9925" cy="4238"/>
+            </a:xfrm>
+          </p:grpSpPr>
+          <p:pic>
+            <p:nvPicPr>
+              <p:cNvPr id="11" name="图片 10"/>
+              <p:cNvPicPr>
+                <a:picLocks noChangeAspect="1"/>
+              </p:cNvPicPr>
+              <p:nvPr>
+                <p:custDataLst>
+                  <p:tags r:id="rId5"/>
+                </p:custDataLst>
+              </p:nvPr>
+            </p:nvPicPr>
+            <p:blipFill>
+              <a:blip r:embed="rId6"/>
+              <a:stretch>
+                <a:fillRect/>
+              </a:stretch>
+            </p:blipFill>
+            <p:spPr>
+              <a:xfrm>
+                <a:off x="1113" y="5977"/>
+                <a:ext cx="7575" cy="645"/>
+              </a:xfrm>
+              <a:prstGeom prst="rect">
+                <a:avLst/>
+              </a:prstGeom>
+            </p:spPr>
+          </p:pic>
+          <p:pic>
+            <p:nvPicPr>
+              <p:cNvPr id="12" name="图片 11"/>
+              <p:cNvPicPr>
+                <a:picLocks noChangeAspect="1"/>
+              </p:cNvPicPr>
+              <p:nvPr>
+                <p:custDataLst>
+                  <p:tags r:id="rId7"/>
+                </p:custDataLst>
+              </p:nvPr>
+            </p:nvPicPr>
+            <p:blipFill>
+              <a:blip r:embed="rId8"/>
+              <a:srcRect r="1244"/>
+              <a:stretch>
+                <a:fillRect/>
+              </a:stretch>
+            </p:blipFill>
+            <p:spPr>
+              <a:xfrm>
+                <a:off x="985" y="6934"/>
+                <a:ext cx="9925" cy="2370"/>
+              </a:xfrm>
+              <a:prstGeom prst="rect">
+                <a:avLst/>
+              </a:prstGeom>
+            </p:spPr>
+          </p:pic>
+          <p:pic>
+            <p:nvPicPr>
+              <p:cNvPr id="13" name="图片 12"/>
+              <p:cNvPicPr>
+                <a:picLocks noChangeAspect="1"/>
+              </p:cNvPicPr>
+              <p:nvPr>
+                <p:custDataLst>
+                  <p:tags r:id="rId9"/>
+                </p:custDataLst>
+              </p:nvPr>
+            </p:nvPicPr>
+            <p:blipFill>
+              <a:blip r:embed="rId10"/>
+              <a:stretch>
+                <a:fillRect/>
+              </a:stretch>
+            </p:blipFill>
+            <p:spPr>
+              <a:xfrm>
+                <a:off x="1181" y="9615"/>
+                <a:ext cx="7800" cy="600"/>
+              </a:xfrm>
+              <a:prstGeom prst="rect">
+                <a:avLst/>
+              </a:prstGeom>
+            </p:spPr>
+          </p:pic>
+        </p:grpSp>
+      </p:grpSp>
+      <p:grpSp>
+        <p:nvGrpSpPr>
+          <p:cNvPr id="24" name="组合 23"/>
+          <p:cNvGrpSpPr/>
+          <p:nvPr/>
+        </p:nvGrpSpPr>
+        <p:grpSpPr>
+          <a:xfrm>
+            <a:off x="2419985" y="4510405"/>
+            <a:ext cx="7351395" cy="2012315"/>
+            <a:chOff x="2130" y="6637"/>
+            <a:chExt cx="13950" cy="4395"/>
+          </a:xfrm>
+        </p:grpSpPr>
+        <p:pic>
+          <p:nvPicPr>
+            <p:cNvPr id="20" name="图片 19"/>
+            <p:cNvPicPr>
+              <a:picLocks noChangeAspect="1"/>
+            </p:cNvPicPr>
+            <p:nvPr>
+              <p:custDataLst>
+                <p:tags r:id="rId11"/>
+              </p:custDataLst>
+            </p:nvPr>
+          </p:nvPicPr>
+          <p:blipFill>
+            <a:blip r:embed="rId12"/>
+            <a:stretch>
+              <a:fillRect/>
+            </a:stretch>
+          </p:blipFill>
+          <p:spPr>
+            <a:xfrm>
+              <a:off x="3822" y="6637"/>
+              <a:ext cx="10695" cy="1110"/>
+            </a:xfrm>
+            <a:prstGeom prst="rect">
+              <a:avLst/>
+            </a:prstGeom>
+          </p:spPr>
+        </p:pic>
+        <p:pic>
+          <p:nvPicPr>
+            <p:cNvPr id="21" name="图片 20"/>
+            <p:cNvPicPr>
+              <a:picLocks noChangeAspect="1"/>
+            </p:cNvPicPr>
+            <p:nvPr>
+              <p:custDataLst>
+                <p:tags r:id="rId13"/>
+              </p:custDataLst>
+            </p:nvPr>
+          </p:nvPicPr>
+          <p:blipFill>
+            <a:blip r:embed="rId14"/>
+            <a:stretch>
+              <a:fillRect/>
+            </a:stretch>
+          </p:blipFill>
+          <p:spPr>
+            <a:xfrm>
+              <a:off x="2506" y="7703"/>
+              <a:ext cx="13335" cy="1080"/>
+            </a:xfrm>
+            <a:prstGeom prst="rect">
+              <a:avLst/>
+            </a:prstGeom>
+          </p:spPr>
+        </p:pic>
+        <p:pic>
+          <p:nvPicPr>
+            <p:cNvPr id="22" name="图片 21"/>
+            <p:cNvPicPr>
+              <a:picLocks noChangeAspect="1"/>
+            </p:cNvPicPr>
+            <p:nvPr>
+              <p:custDataLst>
+                <p:tags r:id="rId15"/>
+              </p:custDataLst>
+            </p:nvPr>
+          </p:nvPicPr>
+          <p:blipFill>
+            <a:blip r:embed="rId16"/>
+            <a:stretch>
+              <a:fillRect/>
+            </a:stretch>
+          </p:blipFill>
+          <p:spPr>
+            <a:xfrm>
+              <a:off x="2130" y="8800"/>
+              <a:ext cx="13950" cy="1185"/>
+            </a:xfrm>
+            <a:prstGeom prst="rect">
+              <a:avLst/>
+            </a:prstGeom>
+          </p:spPr>
+        </p:pic>
+        <p:pic>
+          <p:nvPicPr>
+            <p:cNvPr id="23" name="图片 22"/>
+            <p:cNvPicPr>
+              <a:picLocks noChangeAspect="1"/>
+            </p:cNvPicPr>
+            <p:nvPr>
+              <p:custDataLst>
+                <p:tags r:id="rId17"/>
+              </p:custDataLst>
+            </p:nvPr>
+          </p:nvPicPr>
+          <p:blipFill>
+            <a:blip r:embed="rId18"/>
+            <a:stretch>
+              <a:fillRect/>
+            </a:stretch>
+          </p:blipFill>
+          <p:spPr>
+            <a:xfrm>
+              <a:off x="4998" y="9922"/>
+              <a:ext cx="8190" cy="1110"/>
+            </a:xfrm>
+            <a:prstGeom prst="rect">
+              <a:avLst/>
+            </a:prstGeom>
+          </p:spPr>
+        </p:pic>
+      </p:grpSp>
+      <p:cxnSp>
+        <p:nvCxnSpPr>
+          <p:cNvPr id="25" name="直接连接符 24"/>
+          <p:cNvCxnSpPr/>
+          <p:nvPr/>
+        </p:nvCxnSpPr>
+        <p:spPr>
+          <a:xfrm flipV="1">
+            <a:off x="937260" y="4396105"/>
+            <a:ext cx="10469245" cy="20320"/>
+          </a:xfrm>
+          <a:prstGeom prst="line">
+            <a:avLst/>
+          </a:prstGeom>
+          <a:ln w="12700" cap="flat" cmpd="sng" algn="ctr">
+            <a:solidFill>
+              <a:schemeClr val="accent1"/>
+            </a:solidFill>
+            <a:prstDash val="dash"/>
+            <a:miter lim="800000"/>
+          </a:ln>
+        </p:spPr>
+        <p:style>
+          <a:lnRef idx="0">
+            <a:schemeClr val="accent1"/>
+          </a:lnRef>
+          <a:fillRef idx="0">
+            <a:srgbClr val="FFFFFF"/>
+          </a:fillRef>
+          <a:effectRef idx="0">
+            <a:srgbClr val="FFFFFF"/>
+          </a:effectRef>
+          <a:fontRef idx="minor">
+            <a:schemeClr val="tx1"/>
+          </a:fontRef>
+        </p:style>
+      </p:cxnSp>
+      <p:sp>
+        <p:nvSpPr>
+          <p:cNvPr id="26" name="文本框 25"/>
+          <p:cNvSpPr txBox="1"/>
+          <p:nvPr/>
+        </p:nvSpPr>
+        <p:spPr>
+          <a:xfrm>
+            <a:off x="8909685" y="6189345"/>
+            <a:ext cx="4064000" cy="368300"/>
+          </a:xfrm>
+          <a:prstGeom prst="rect">
+            <a:avLst/>
+          </a:prstGeom>
+          <a:noFill/>
+        </p:spPr>
+        <p:txBody>
+          <a:bodyPr wrap="square" rtlCol="0">
+            <a:spAutoFit/>
+          </a:bodyPr>
+          <a:p>
+            <a:r>
+              <a:rPr lang="en-US" altLang="zh-CN" b="1"/>
+              <a:t>: semantics of forward evaluation</a:t>
+            </a:r>
+            <a:endParaRPr lang="en-US" altLang="zh-CN" b="1"/>
+          </a:p>
+        </p:txBody>
+      </p:sp>
+      <p:sp>
+        <p:nvSpPr>
+          <p:cNvPr id="27" name="文本框 26"/>
+          <p:cNvSpPr txBox="1"/>
+          <p:nvPr/>
+        </p:nvSpPr>
+        <p:spPr>
+          <a:xfrm>
+            <a:off x="8909685" y="3933825"/>
+            <a:ext cx="4064000" cy="368300"/>
+          </a:xfrm>
+          <a:prstGeom prst="rect">
+            <a:avLst/>
+          </a:prstGeom>
+          <a:noFill/>
+        </p:spPr>
+        <p:txBody>
+          <a:bodyPr wrap="square" rtlCol="0">
+            <a:spAutoFit/>
+          </a:bodyPr>
+          <a:p>
+            <a:r>
+              <a:rPr lang="en-US" altLang="zh-CN" b="1"/>
+              <a:t>: semantics of desguaring</a:t>
+            </a:r>
+            <a:endParaRPr lang="en-US" altLang="zh-CN" b="1"/>
+          </a:p>
+        </p:txBody>
+      </p:sp>
+    </p:spTree>
+  </p:cSld>
+  <p:clrMapOvr>
+    <a:masterClrMapping/>
+  </p:clrMapOvr>
+  <p:timing>
+    <p:tnLst>
+      <p:par>
+        <p:cTn id="1" dur="indefinite" restart="never" nodeType="tmRoot"/>
+      </p:par>
+    </p:tnLst>
+  </p:timing>
+</p:sld>
+</file>
+
+<file path=ppt/slides/slide28.xml><?xml version="1.0" encoding="utf-8"?>
+<p:sld xmlns:a="http://schemas.openxmlformats.org/drawingml/2006/main" xmlns:r="http://schemas.openxmlformats.org/officeDocument/2006/relationships" xmlns:p="http://schemas.openxmlformats.org/presentationml/2006/main">
+  <p:cSld>
+    <p:spTree>
+      <p:nvGrpSpPr>
+        <p:cNvPr id="1" name=""/>
+        <p:cNvGrpSpPr/>
+        <p:nvPr/>
+      </p:nvGrpSpPr>
+      <p:grpSpPr/>
+      <p:sp>
+        <p:nvSpPr>
+          <p:cNvPr id="2" name="标题 1"/>
+          <p:cNvSpPr>
+            <a:spLocks noGrp="1"/>
+          </p:cNvSpPr>
+          <p:nvPr>
+            <p:ph type="title"/>
+          </p:nvPr>
+        </p:nvSpPr>
+        <p:spPr/>
+        <p:txBody>
+          <a:bodyPr/>
+          <a:p>
+            <a:r>
+              <a:rPr lang="en-US" altLang="zh-CN"/>
+              <a:t>Next Plan</a:t>
+            </a:r>
+            <a:endParaRPr lang="en-US" altLang="zh-CN"/>
+          </a:p>
+        </p:txBody>
+      </p:sp>
+      <p:sp>
+        <p:nvSpPr>
+          <p:cNvPr id="3" name="内容占位符 2"/>
+          <p:cNvSpPr>
+            <a:spLocks noGrp="1"/>
+          </p:cNvSpPr>
+          <p:nvPr>
+            <p:ph idx="1"/>
+          </p:nvPr>
+        </p:nvSpPr>
+        <p:spPr>
+          <a:xfrm>
+            <a:off x="838200" y="1825625"/>
+            <a:ext cx="12972415" cy="5383530"/>
+          </a:xfrm>
+        </p:spPr>
+        <p:txBody>
+          <a:bodyPr/>
+          <a:p>
+            <a:pPr marL="514350" indent="-514350">
+              <a:buAutoNum type="arabicPeriod"/>
+            </a:pPr>
+            <a:r>
+              <a:rPr lang="en-US" altLang="zh-CN" sz="2400"/>
+              <a:t>Read the source code of Bidirectional Preview.	</a:t>
+            </a:r>
+            <a:r>
+              <a:rPr lang="en-US" altLang="zh-CN" sz="2400" b="1">
+                <a:solidFill>
+                  <a:srgbClr val="00B050"/>
+                </a:solidFill>
+              </a:rPr>
+              <a:t>Done.</a:t>
+            </a:r>
+            <a:endParaRPr lang="en-US" altLang="zh-CN" sz="2400"/>
+          </a:p>
+          <a:p>
+            <a:pPr marL="514350" indent="-514350">
+              <a:buAutoNum type="arabicPeriod"/>
+            </a:pPr>
+            <a:r>
+              <a:rPr lang="en-US" altLang="zh-CN" sz="2400"/>
+              <a:t>Remove all the hole out of it.			</a:t>
+            </a:r>
+            <a:r>
+              <a:rPr lang="en-US" altLang="zh-CN" sz="2400" b="1">
+                <a:solidFill>
+                  <a:srgbClr val="00B050"/>
+                </a:solidFill>
+              </a:rPr>
+              <a:t>Done.</a:t>
+            </a:r>
+            <a:endParaRPr lang="en-US" altLang="zh-CN" sz="2400"/>
+          </a:p>
+          <a:p>
+            <a:pPr marL="514350" indent="-514350">
+              <a:buAutoNum type="arabicPeriod"/>
+            </a:pPr>
+            <a:r>
+              <a:rPr lang="en-US" altLang="zh-CN" sz="2400"/>
+              <a:t>Add concatenation of string. 			</a:t>
+            </a:r>
+            <a:r>
+              <a:rPr lang="en-US" altLang="zh-CN" sz="2400" b="1">
+                <a:solidFill>
+                  <a:srgbClr val="00B050"/>
+                </a:solidFill>
+              </a:rPr>
+              <a:t>Done.</a:t>
+            </a:r>
+            <a:endParaRPr lang="en-US" altLang="zh-CN" sz="2400"/>
+          </a:p>
+          <a:p>
+            <a:pPr marL="514350" indent="-514350">
+              <a:buAutoNum type="arabicPeriod"/>
+            </a:pPr>
+            <a:r>
+              <a:rPr lang="en-US" altLang="zh-CN" sz="2400"/>
+              <a:t>Add Forward - String Template.			</a:t>
+            </a:r>
+            <a:r>
+              <a:rPr lang="en-US" altLang="zh-CN" sz="2400" b="1">
+                <a:solidFill>
+                  <a:srgbClr val="FF0000"/>
+                </a:solidFill>
+              </a:rPr>
+              <a:t>Doing.	</a:t>
+            </a:r>
+            <a:r>
+              <a:rPr lang="en-US" altLang="zh-CN" sz="2400" b="1">
+                <a:solidFill>
+                  <a:srgbClr val="00B050"/>
+                </a:solidFill>
+              </a:rPr>
+              <a:t>This Week</a:t>
+            </a:r>
+            <a:endParaRPr lang="en-US" altLang="zh-CN" sz="2400"/>
+          </a:p>
+          <a:p>
+            <a:pPr lvl="1"/>
+            <a:r>
+              <a:rPr lang="en-US" altLang="zh-CN" sz="2000" b="1">
+                <a:solidFill>
+                  <a:srgbClr val="00B050"/>
+                </a:solidFill>
+              </a:rPr>
+              <a:t>Syntax </a:t>
+            </a:r>
+            <a:r>
+              <a:rPr lang="en-US" altLang="zh-CN" sz="2000"/>
+              <a:t>&amp; </a:t>
+            </a:r>
+            <a:r>
+              <a:rPr lang="en-US" altLang="zh-CN" sz="2000" b="1">
+                <a:solidFill>
+                  <a:srgbClr val="FFC000"/>
+                </a:solidFill>
+              </a:rPr>
+              <a:t>Parser</a:t>
+            </a:r>
+            <a:endParaRPr lang="en-US" altLang="zh-CN" sz="2000"/>
+          </a:p>
+          <a:p>
+            <a:pPr lvl="1"/>
+            <a:r>
+              <a:rPr lang="en-US" altLang="zh-CN" sz="2000" b="1">
+                <a:solidFill>
+                  <a:srgbClr val="FF0000"/>
+                </a:solidFill>
+              </a:rPr>
+              <a:t>Desugar</a:t>
+            </a:r>
+            <a:endParaRPr lang="en-US" altLang="zh-CN" sz="2000" b="1">
+              <a:solidFill>
+                <a:srgbClr val="FF0000"/>
+              </a:solidFill>
+            </a:endParaRPr>
+          </a:p>
+          <a:p>
+            <a:pPr marL="514350" lvl="0" indent="-514350">
+              <a:buAutoNum type="arabicPeriod"/>
+            </a:pPr>
+            <a:r>
+              <a:rPr lang="en-US" altLang="zh-CN" sz="2400"/>
+              <a:t>Add Backward - String Template.			</a:t>
+            </a:r>
+            <a:r>
+              <a:rPr lang="en-US" altLang="zh-CN" sz="2400" b="1">
+                <a:solidFill>
+                  <a:srgbClr val="FFC000"/>
+                </a:solidFill>
+              </a:rPr>
+              <a:t>Not Start	</a:t>
+            </a:r>
+            <a:r>
+              <a:rPr lang="en-US" altLang="zh-CN" sz="2400" b="1">
+                <a:solidFill>
+                  <a:srgbClr val="00B050"/>
+                </a:solidFill>
+              </a:rPr>
+              <a:t>This Week</a:t>
+            </a:r>
+            <a:endParaRPr lang="en-US" altLang="zh-CN" sz="2400"/>
+          </a:p>
+          <a:p>
+            <a:pPr marL="514350" lvl="0" indent="-514350">
+              <a:buAutoNum type="arabicPeriod"/>
+            </a:pPr>
+            <a:r>
+              <a:rPr lang="en-US" altLang="zh-CN" sz="2400"/>
+              <a:t>Add Forward &amp; Backward - Article Template.	</a:t>
+            </a:r>
+            <a:r>
+              <a:rPr lang="en-US" altLang="zh-CN" sz="2400" b="1">
+                <a:solidFill>
+                  <a:srgbClr val="FFC000"/>
+                </a:solidFill>
+              </a:rPr>
+              <a:t>Not Start	</a:t>
+            </a:r>
+            <a:r>
+              <a:rPr lang="en-US" altLang="zh-CN" sz="2400" b="1">
+                <a:solidFill>
+                  <a:srgbClr val="00B050"/>
+                </a:solidFill>
+              </a:rPr>
+              <a:t>Before Next Thursday</a:t>
+            </a:r>
+            <a:endParaRPr lang="en-US" altLang="zh-CN" sz="2400">
+              <a:solidFill>
+                <a:srgbClr val="FFC000"/>
+              </a:solidFill>
+            </a:endParaRPr>
+          </a:p>
+          <a:p>
+            <a:pPr marL="514350" lvl="0" indent="-514350">
+              <a:buAutoNum type="arabicPeriod"/>
+            </a:pPr>
+            <a:r>
+              <a:rPr lang="en-US" altLang="zh-CN" sz="2400"/>
+              <a:t>Exploring Structural Modification of List.		</a:t>
+            </a:r>
+            <a:r>
+              <a:rPr lang="en-US" altLang="zh-CN" sz="2400" b="1">
+                <a:solidFill>
+                  <a:srgbClr val="FFC000"/>
+                </a:solidFill>
+              </a:rPr>
+              <a:t>Not Start	...</a:t>
+            </a:r>
+            <a:endParaRPr lang="en-US" altLang="zh-CN" sz="2400"/>
+          </a:p>
+          <a:p>
+            <a:pPr lvl="1"/>
+            <a:endParaRPr lang="en-US" altLang="zh-CN" sz="2000"/>
+          </a:p>
+          <a:p>
+            <a:endParaRPr lang="en-US" altLang="zh-CN" sz="2400"/>
+          </a:p>
+          <a:p>
+            <a:endParaRPr lang="en-US" altLang="zh-CN" sz="2400"/>
+          </a:p>
+        </p:txBody>
+      </p:sp>
+    </p:spTree>
+  </p:cSld>
+  <p:clrMapOvr>
+    <a:masterClrMapping/>
+  </p:clrMapOvr>
+</p:sld>
+</file>
+
+<file path=ppt/slides/slide29.xml><?xml version="1.0" encoding="utf-8"?>
+<p:sld xmlns:a="http://schemas.openxmlformats.org/drawingml/2006/main" xmlns:r="http://schemas.openxmlformats.org/officeDocument/2006/relationships" xmlns:p="http://schemas.openxmlformats.org/presentationml/2006/main">
+  <p:cSld>
+    <p:spTree>
+      <p:nvGrpSpPr>
+        <p:cNvPr id="1" name=""/>
+        <p:cNvGrpSpPr/>
+        <p:nvPr/>
+      </p:nvGrpSpPr>
+      <p:grpSpPr/>
+      <p:sp>
+        <p:nvSpPr>
+          <p:cNvPr id="2" name="标题 1"/>
+          <p:cNvSpPr>
+            <a:spLocks noGrp="1"/>
+          </p:cNvSpPr>
+          <p:nvPr>
+            <p:ph type="title"/>
+          </p:nvPr>
+        </p:nvSpPr>
+        <p:spPr/>
+        <p:txBody>
+          <a:bodyPr/>
+          <a:p>
+            <a:r>
+              <a:rPr lang="en-US" altLang="zh-CN"/>
+              <a:t>Question</a:t>
+            </a:r>
+            <a:endParaRPr lang="en-US" altLang="zh-CN"/>
+          </a:p>
+        </p:txBody>
+      </p:sp>
+      <p:sp>
+        <p:nvSpPr>
+          <p:cNvPr id="3" name="内容占位符 2"/>
+          <p:cNvSpPr>
+            <a:spLocks noGrp="1"/>
+          </p:cNvSpPr>
+          <p:nvPr>
+            <p:ph idx="1"/>
+          </p:nvPr>
+        </p:nvSpPr>
+        <p:spPr/>
+        <p:txBody>
+          <a:bodyPr/>
+          <a:p>
+            <a:r>
+              <a:rPr lang="en-US" altLang="zh-CN"/>
+              <a:t>...</a:t>
+            </a:r>
+            <a:endParaRPr lang="en-US" altLang="zh-CN"/>
+          </a:p>
+        </p:txBody>
+      </p:sp>
+    </p:spTree>
+  </p:cSld>
+  <p:clrMapOvr>
+    <a:masterClrMapping/>
+  </p:clrMapOvr>
+</p:sld>
+</file>
+
+<file path=ppt/slides/slide3.xml><?xml version="1.0" encoding="utf-8"?>
+<p:sld xmlns:a="http://schemas.openxmlformats.org/drawingml/2006/main" xmlns:r="http://schemas.openxmlformats.org/officeDocument/2006/relationships" xmlns:p="http://schemas.openxmlformats.org/presentationml/2006/main">
+  <p:cSld>
+    <p:spTree>
+      <p:nvGrpSpPr>
+        <p:cNvPr id="1" name=""/>
+        <p:cNvGrpSpPr/>
+        <p:nvPr/>
+      </p:nvGrpSpPr>
+      <p:grpSpPr/>
+      <p:sp>
+        <p:nvSpPr>
+          <p:cNvPr id="2" name="标题 1"/>
+          <p:cNvSpPr>
+            <a:spLocks noGrp="1"/>
+          </p:cNvSpPr>
+          <p:nvPr>
+            <p:ph type="title"/>
+          </p:nvPr>
+        </p:nvSpPr>
+        <p:spPr/>
+        <p:txBody>
+          <a:bodyPr/>
+          <a:p>
+            <a:r>
+              <a:rPr lang="en-US" altLang="zh-CN"/>
+              <a:t>Preliminaries</a:t>
+            </a:r>
+            <a:endParaRPr lang="en-US" altLang="zh-CN"/>
+          </a:p>
+        </p:txBody>
+      </p:sp>
+      <p:sp>
+        <p:nvSpPr>
+          <p:cNvPr id="3" name="内容占位符 2"/>
+          <p:cNvSpPr>
+            <a:spLocks noGrp="1"/>
+          </p:cNvSpPr>
+          <p:nvPr>
+            <p:ph idx="1"/>
+          </p:nvPr>
+        </p:nvSpPr>
+        <p:spPr/>
+        <p:txBody>
+          <a:bodyPr/>
+          <a:p>
+            <a:r>
+              <a:rPr lang="en-US" altLang="zh-CN"/>
+              <a:t>Bidirectional Transformation (BX)</a:t>
+            </a:r>
+            <a:endParaRPr lang="en-US" altLang="zh-CN"/>
+          </a:p>
+          <a:p>
+            <a:pPr lvl="1"/>
+            <a:r>
+              <a:rPr lang="en-US" altLang="zh-CN"/>
+              <a:t>Bidirectional Programming Language (Lenses) </a:t>
+            </a:r>
+            <a:endParaRPr lang="en-US" altLang="zh-CN"/>
+          </a:p>
+          <a:p>
+            <a:pPr lvl="1"/>
+            <a:r>
+              <a:rPr lang="en-US" altLang="zh-CN"/>
+              <a:t>Bidirectional Evaluation</a:t>
+            </a:r>
+            <a:endParaRPr lang="en-US" altLang="zh-CN"/>
+          </a:p>
+          <a:p>
+            <a:r>
+              <a:rPr lang="en-US" altLang="zh-CN"/>
+              <a:t>A Core Calculus for Documents</a:t>
+            </a:r>
+            <a:endParaRPr lang="en-US" altLang="zh-CN"/>
+          </a:p>
+          <a:p>
+            <a:pPr lvl="1"/>
+            <a:r>
+              <a:rPr lang="en-US" altLang="zh-CN" sz="2400"/>
+              <a:t>documents &amp; document languages</a:t>
+            </a:r>
+            <a:endParaRPr lang="en-US" altLang="zh-CN" sz="2400"/>
+          </a:p>
+          <a:p>
+            <a:pPr lvl="1"/>
+            <a:r>
+              <a:rPr lang="en-US" altLang="zh-CN"/>
+              <a:t>eight levels formal semantics of document languages (document calculus)</a:t>
+            </a:r>
+            <a:endParaRPr lang="en-US" altLang="zh-CN"/>
+          </a:p>
+          <a:p>
+            <a:pPr lvl="1"/>
+            <a:r>
+              <a:rPr lang="en-US" altLang="zh-CN"/>
+              <a:t>extend it with complex document features, e.g., Reactivity</a:t>
+            </a:r>
+            <a:endParaRPr lang="en-US" altLang="zh-CN"/>
+          </a:p>
+          <a:p>
+            <a:pPr lvl="1"/>
+            <a:endParaRPr lang="en-US" altLang="zh-CN"/>
+          </a:p>
+          <a:p>
+            <a:endParaRPr lang="en-US" altLang="zh-CN"/>
+          </a:p>
+        </p:txBody>
+      </p:sp>
+      <p:sp>
+        <p:nvSpPr>
+          <p:cNvPr id="7" name="右箭头 6">
+            <a:hlinkClick r:id="rId1" action="ppaction://hlinksldjump"/>
           </p:cNvPr>
           <p:cNvSpPr/>
           <p:nvPr/>
         </p:nvSpPr>
         <p:spPr>
           <a:xfrm>
-            <a:off x="6096000" y="3670935"/>
+            <a:off x="7364730" y="2355850"/>
             <a:ext cx="323850" cy="233045"/>
           </a:xfrm>
           <a:prstGeom prst="rightArrow">
@@ -6751,15 +9068,15 @@
       </p:sp>
       <p:sp>
         <p:nvSpPr>
-          <p:cNvPr id="10" name="右箭头 9">
-            <a:hlinkClick r:id="rId4" tooltip="" action="ppaction://hlinksldjump"/>
+          <p:cNvPr id="8" name="右箭头 7">
+            <a:hlinkClick r:id="rId2" action="ppaction://hlinksldjump"/>
           </p:cNvPr>
           <p:cNvSpPr/>
           <p:nvPr/>
         </p:nvSpPr>
         <p:spPr>
           <a:xfrm>
-            <a:off x="10840085" y="4055745"/>
+            <a:off x="4664075" y="2771140"/>
             <a:ext cx="323850" cy="233045"/>
           </a:xfrm>
           <a:prstGeom prst="rightArrow">
@@ -6792,15 +9109,15 @@
       </p:sp>
       <p:sp>
         <p:nvSpPr>
-          <p:cNvPr id="11" name="右箭头 10">
-            <a:hlinkClick r:id="rId5" tooltip="" action="ppaction://hlinksldjump"/>
+          <p:cNvPr id="9" name="右箭头 8">
+            <a:hlinkClick r:id="rId3" action="ppaction://hlinksldjump"/>
           </p:cNvPr>
           <p:cNvSpPr/>
           <p:nvPr/>
         </p:nvSpPr>
         <p:spPr>
           <a:xfrm>
-            <a:off x="8938260" y="4470400"/>
+            <a:off x="6096000" y="3670935"/>
             <a:ext cx="323850" cy="233045"/>
           </a:xfrm>
           <a:prstGeom prst="rightArrow">
@@ -6831,6 +9148,88 @@
           </a:p>
         </p:txBody>
       </p:sp>
+      <p:sp>
+        <p:nvSpPr>
+          <p:cNvPr id="10" name="右箭头 9">
+            <a:hlinkClick r:id="rId4" action="ppaction://hlinksldjump"/>
+          </p:cNvPr>
+          <p:cNvSpPr/>
+          <p:nvPr/>
+        </p:nvSpPr>
+        <p:spPr>
+          <a:xfrm>
+            <a:off x="10840085" y="4055745"/>
+            <a:ext cx="323850" cy="233045"/>
+          </a:xfrm>
+          <a:prstGeom prst="rightArrow">
+            <a:avLst/>
+          </a:prstGeom>
+        </p:spPr>
+        <p:style>
+          <a:lnRef idx="2">
+            <a:schemeClr val="accent1">
+              <a:lumMod val="75000"/>
+            </a:schemeClr>
+          </a:lnRef>
+          <a:fillRef idx="1">
+            <a:schemeClr val="accent1"/>
+          </a:fillRef>
+          <a:effectRef idx="0">
+            <a:srgbClr val="FFFFFF"/>
+          </a:effectRef>
+          <a:fontRef idx="minor">
+            <a:schemeClr val="lt1"/>
+          </a:fontRef>
+        </p:style>
+        <p:txBody>
+          <a:bodyPr rtlCol="0" anchor="ctr"/>
+          <a:p>
+            <a:pPr algn="ctr"/>
+            <a:endParaRPr lang="zh-CN" altLang="en-US"/>
+          </a:p>
+        </p:txBody>
+      </p:sp>
+      <p:sp>
+        <p:nvSpPr>
+          <p:cNvPr id="11" name="右箭头 10">
+            <a:hlinkClick r:id="rId5" action="ppaction://hlinksldjump"/>
+          </p:cNvPr>
+          <p:cNvSpPr/>
+          <p:nvPr/>
+        </p:nvSpPr>
+        <p:spPr>
+          <a:xfrm>
+            <a:off x="8938260" y="4470400"/>
+            <a:ext cx="323850" cy="233045"/>
+          </a:xfrm>
+          <a:prstGeom prst="rightArrow">
+            <a:avLst/>
+          </a:prstGeom>
+        </p:spPr>
+        <p:style>
+          <a:lnRef idx="2">
+            <a:schemeClr val="accent1">
+              <a:lumMod val="75000"/>
+            </a:schemeClr>
+          </a:lnRef>
+          <a:fillRef idx="1">
+            <a:schemeClr val="accent1"/>
+          </a:fillRef>
+          <a:effectRef idx="0">
+            <a:srgbClr val="FFFFFF"/>
+          </a:effectRef>
+          <a:fontRef idx="minor">
+            <a:schemeClr val="lt1"/>
+          </a:fontRef>
+        </p:style>
+        <p:txBody>
+          <a:bodyPr rtlCol="0" anchor="ctr"/>
+          <a:p>
+            <a:pPr algn="ctr"/>
+            <a:endParaRPr lang="zh-CN" altLang="en-US"/>
+          </a:p>
+        </p:txBody>
+      </p:sp>
     </p:spTree>
   </p:cSld>
   <p:clrMapOvr>
@@ -6840,6 +9239,319 @@
 </file>
 
 <file path=ppt/slides/slide4.xml><?xml version="1.0" encoding="utf-8"?>
+<p:sld xmlns:a="http://schemas.openxmlformats.org/drawingml/2006/main" xmlns:r="http://schemas.openxmlformats.org/officeDocument/2006/relationships" xmlns:p="http://schemas.openxmlformats.org/presentationml/2006/main">
+  <p:cSld>
+    <p:spTree>
+      <p:nvGrpSpPr>
+        <p:cNvPr id="1" name=""/>
+        <p:cNvGrpSpPr/>
+        <p:nvPr/>
+      </p:nvGrpSpPr>
+      <p:grpSpPr/>
+      <p:sp>
+        <p:nvSpPr>
+          <p:cNvPr id="2" name="标题 1"/>
+          <p:cNvSpPr>
+            <a:spLocks noGrp="1"/>
+          </p:cNvSpPr>
+          <p:nvPr>
+            <p:ph type="title"/>
+          </p:nvPr>
+        </p:nvSpPr>
+        <p:spPr/>
+        <p:txBody>
+          <a:bodyPr/>
+          <a:p>
+            <a:r>
+              <a:rPr lang="en-US" altLang="zh-CN"/>
+              <a:t>Bidirectional Document Calculus</a:t>
+            </a:r>
+            <a:endParaRPr lang="en-US" altLang="zh-CN"/>
+          </a:p>
+        </p:txBody>
+      </p:sp>
+      <p:sp>
+        <p:nvSpPr>
+          <p:cNvPr id="3" name="内容占位符 2"/>
+          <p:cNvSpPr>
+            <a:spLocks noGrp="1"/>
+          </p:cNvSpPr>
+          <p:nvPr>
+            <p:ph idx="1"/>
+          </p:nvPr>
+        </p:nvSpPr>
+        <p:spPr/>
+        <p:txBody>
+          <a:bodyPr>
+            <a:normAutofit lnSpcReduction="10000"/>
+          </a:bodyPr>
+          <a:p>
+            <a:r>
+              <a:rPr lang="en-US" altLang="zh-CN" b="1"/>
+              <a:t>Question:</a:t>
+            </a:r>
+            <a:r>
+              <a:rPr lang="en-US" altLang="zh-CN"/>
+              <a:t> Design the </a:t>
+            </a:r>
+            <a:r>
+              <a:rPr lang="en-US" altLang="zh-CN" b="1">
+                <a:solidFill>
+                  <a:schemeClr val="accent6">
+                    <a:lumMod val="60000"/>
+                    <a:lumOff val="40000"/>
+                  </a:schemeClr>
+                </a:solidFill>
+              </a:rPr>
+              <a:t>Bidirectional Evaluation</a:t>
+            </a:r>
+            <a:r>
+              <a:rPr lang="en-US" altLang="zh-CN"/>
+              <a:t> for the </a:t>
+            </a:r>
+            <a:r>
+              <a:rPr lang="en-US" altLang="zh-CN" b="1">
+                <a:solidFill>
+                  <a:schemeClr val="accent5">
+                    <a:lumMod val="75000"/>
+                  </a:schemeClr>
+                </a:solidFill>
+              </a:rPr>
+              <a:t>Core Calculus of Documents</a:t>
+            </a:r>
+            <a:r>
+              <a:rPr lang="en-US" altLang="zh-CN"/>
+              <a:t> - more specifically - </a:t>
+            </a:r>
+            <a:r>
+              <a:rPr lang="en-US" altLang="zh-CN" b="1">
+                <a:solidFill>
+                  <a:schemeClr val="accent5">
+                    <a:lumMod val="60000"/>
+                    <a:lumOff val="40000"/>
+                  </a:schemeClr>
+                </a:solidFill>
+              </a:rPr>
+              <a:t>Article Template Program</a:t>
+            </a:r>
+            <a:r>
+              <a:rPr lang="en-US" altLang="zh-CN"/>
+              <a:t>. Futhermore, explore the way to </a:t>
+            </a:r>
+            <a:r>
+              <a:rPr lang="en-US" altLang="zh-CN" b="1">
+                <a:solidFill>
+                  <a:schemeClr val="accent4">
+                    <a:lumMod val="75000"/>
+                  </a:schemeClr>
+                </a:solidFill>
+              </a:rPr>
+              <a:t>extend</a:t>
+            </a:r>
+            <a:r>
+              <a:rPr lang="en-US" altLang="zh-CN" b="1"/>
+              <a:t> </a:t>
+            </a:r>
+            <a:r>
+              <a:rPr lang="en-US" altLang="zh-CN"/>
+              <a:t>it </a:t>
+            </a:r>
+            <a:r>
+              <a:rPr lang="en-US" altLang="zh-CN" b="1">
+                <a:solidFill>
+                  <a:schemeClr val="accent4">
+                    <a:lumMod val="75000"/>
+                  </a:schemeClr>
+                </a:solidFill>
+              </a:rPr>
+              <a:t>with reactivity</a:t>
+            </a:r>
+            <a:r>
+              <a:rPr lang="en-US" altLang="zh-CN"/>
+              <a:t>.</a:t>
+            </a:r>
+            <a:endParaRPr lang="en-US" altLang="zh-CN"/>
+          </a:p>
+          <a:p>
+            <a:r>
+              <a:rPr lang="en-US" altLang="zh-CN" b="1"/>
+              <a:t>Motivation </a:t>
+            </a:r>
+            <a:endParaRPr lang="en-US" altLang="zh-CN" b="1"/>
+          </a:p>
+          <a:p>
+            <a:pPr lvl="1"/>
+            <a:r>
+              <a:rPr lang="zh-CN" altLang="en-US"/>
+              <a:t>The traditional way of </a:t>
+            </a:r>
+            <a:r>
+              <a:rPr lang="en-US" altLang="zh-CN"/>
+              <a:t>authoring </a:t>
+            </a:r>
+            <a:r>
+              <a:rPr lang="zh-CN" altLang="en-US"/>
+              <a:t>documents is </a:t>
+            </a:r>
+            <a:r>
+              <a:rPr lang="zh-CN" altLang="en-US" b="1">
+                <a:solidFill>
+                  <a:srgbClr val="0070C0"/>
+                </a:solidFill>
+              </a:rPr>
+              <a:t>intuitive</a:t>
+            </a:r>
+            <a:r>
+              <a:rPr lang="zh-CN" altLang="en-US"/>
+              <a:t>, </a:t>
+            </a:r>
+            <a:r>
+              <a:rPr lang="zh-CN" altLang="en-US" b="1"/>
+              <a:t>but </a:t>
+            </a:r>
+            <a:r>
+              <a:rPr lang="zh-CN" altLang="en-US"/>
+              <a:t>it is </a:t>
+            </a:r>
+            <a:r>
+              <a:rPr lang="zh-CN" altLang="en-US" b="1">
+                <a:solidFill>
+                  <a:srgbClr val="FFC000"/>
+                </a:solidFill>
+              </a:rPr>
+              <a:t>inefficient</a:t>
+            </a:r>
+            <a:r>
+              <a:rPr lang="zh-CN" altLang="en-US" b="1"/>
+              <a:t> </a:t>
+            </a:r>
+            <a:r>
+              <a:rPr lang="zh-CN" altLang="en-US"/>
+              <a:t>when it comes to duplication and redundancy</a:t>
+            </a:r>
+            <a:r>
+              <a:rPr lang="en-US" altLang="zh-CN"/>
+              <a:t>.</a:t>
+            </a:r>
+            <a:endParaRPr lang="zh-CN" altLang="en-US"/>
+          </a:p>
+          <a:p>
+            <a:pPr lvl="1"/>
+            <a:r>
+              <a:rPr lang="en-US" altLang="zh-CN"/>
+              <a:t>Authoring documents using program is </a:t>
+            </a:r>
+            <a:r>
+              <a:rPr lang="en-US" altLang="zh-CN" b="1">
+                <a:solidFill>
+                  <a:srgbClr val="7030A0"/>
+                </a:solidFill>
+              </a:rPr>
+              <a:t>efficient</a:t>
+            </a:r>
+            <a:r>
+              <a:rPr lang="en-US" altLang="zh-CN"/>
+              <a:t>, but </a:t>
+            </a:r>
+            <a:r>
+              <a:rPr lang="en-US" altLang="zh-CN" b="1">
+                <a:solidFill>
+                  <a:srgbClr val="92D050"/>
+                </a:solidFill>
+              </a:rPr>
+              <a:t>not intuitive</a:t>
+            </a:r>
+            <a:r>
+              <a:rPr lang="en-US" altLang="zh-CN"/>
+              <a:t> and </a:t>
+            </a:r>
+            <a:r>
+              <a:rPr lang="en-US" altLang="zh-CN" b="1">
+                <a:solidFill>
+                  <a:srgbClr val="92D050"/>
+                </a:solidFill>
+              </a:rPr>
+              <a:t>difficult to learn</a:t>
+            </a:r>
+            <a:r>
+              <a:rPr lang="en-US" altLang="zh-CN"/>
+              <a:t>.</a:t>
+            </a:r>
+            <a:endParaRPr lang="en-US" altLang="zh-CN"/>
+          </a:p>
+          <a:p>
+            <a:pPr lvl="1"/>
+            <a:r>
+              <a:rPr lang="en-US" altLang="zh-CN"/>
+              <a:t>Design a novel document language, which not only supports the program to generate the documents, but also supports the direct manipulation of the document and synchronization of the program with the document, which </a:t>
+            </a:r>
+            <a:r>
+              <a:rPr lang="en-US" altLang="zh-CN" b="1"/>
+              <a:t>combines </a:t>
+            </a:r>
+            <a:r>
+              <a:rPr lang="en-US" altLang="zh-CN"/>
+              <a:t>both </a:t>
+            </a:r>
+            <a:r>
+              <a:rPr lang="en-US" altLang="zh-CN" b="1">
+                <a:solidFill>
+                  <a:srgbClr val="7030A0"/>
+                </a:solidFill>
+              </a:rPr>
+              <a:t>efficiency </a:t>
+            </a:r>
+            <a:r>
+              <a:rPr lang="en-US" altLang="zh-CN"/>
+              <a:t>and </a:t>
+            </a:r>
+            <a:r>
+              <a:rPr lang="en-US" altLang="zh-CN" b="1">
+                <a:solidFill>
+                  <a:srgbClr val="0070C0"/>
+                </a:solidFill>
+                <a:sym typeface="+mn-ea"/>
+              </a:rPr>
+              <a:t>intuition</a:t>
+            </a:r>
+            <a:r>
+              <a:rPr lang="en-US" altLang="zh-CN">
+                <a:sym typeface="+mn-ea"/>
+              </a:rPr>
+              <a:t>, as well as </a:t>
+            </a:r>
+            <a:r>
+              <a:rPr lang="en-US" altLang="zh-CN" b="1">
+                <a:solidFill>
+                  <a:srgbClr val="0070C0"/>
+                </a:solidFill>
+                <a:sym typeface="+mn-ea"/>
+              </a:rPr>
+              <a:t>lowers the threshold</a:t>
+            </a:r>
+            <a:r>
+              <a:rPr lang="en-US" altLang="zh-CN" b="1">
+                <a:sym typeface="+mn-ea"/>
+              </a:rPr>
+              <a:t>.</a:t>
+            </a:r>
+            <a:endParaRPr lang="zh-CN" altLang="en-US"/>
+          </a:p>
+          <a:p>
+            <a:pPr lvl="1"/>
+            <a:endParaRPr lang="zh-CN" altLang="en-US"/>
+          </a:p>
+        </p:txBody>
+      </p:sp>
+    </p:spTree>
+  </p:cSld>
+  <p:clrMapOvr>
+    <a:masterClrMapping/>
+  </p:clrMapOvr>
+</p:sld>
+</file>
+
+<file path=ppt/slides/slide5.xml><?xml version="1.0" encoding="utf-8"?>
 <p:sld xmlns:a="http://schemas.openxmlformats.org/drawingml/2006/main" xmlns:r="http://schemas.openxmlformats.org/officeDocument/2006/relationships" xmlns:p="http://schemas.openxmlformats.org/presentationml/2006/main">
   <p:cSld>
     <p:spTree>
@@ -7120,7 +9832,7 @@
 </p:sld>
 </file>
 
-<file path=ppt/slides/slide5.xml><?xml version="1.0" encoding="utf-8"?>
+<file path=ppt/slides/slide6.xml><?xml version="1.0" encoding="utf-8"?>
 <p:sld xmlns:a="http://schemas.openxmlformats.org/drawingml/2006/main" xmlns:r="http://schemas.openxmlformats.org/officeDocument/2006/relationships" xmlns:p="http://schemas.openxmlformats.org/presentationml/2006/main">
   <p:cSld>
     <p:spTree>
@@ -7743,7 +10455,7 @@
 </p:sld>
 </file>
 
-<file path=ppt/slides/slide6.xml><?xml version="1.0" encoding="utf-8"?>
+<file path=ppt/slides/slide7.xml><?xml version="1.0" encoding="utf-8"?>
 <p:sld xmlns:a="http://schemas.openxmlformats.org/drawingml/2006/main" xmlns:r="http://schemas.openxmlformats.org/officeDocument/2006/relationships" xmlns:p="http://schemas.openxmlformats.org/presentationml/2006/main">
   <p:cSld>
     <p:spTree>
@@ -8437,7 +11149,7 @@
 </p:sld>
 </file>
 
-<file path=ppt/slides/slide7.xml><?xml version="1.0" encoding="utf-8"?>
+<file path=ppt/slides/slide8.xml><?xml version="1.0" encoding="utf-8"?>
 <p:sld xmlns:a="http://schemas.openxmlformats.org/drawingml/2006/main" xmlns:r="http://schemas.openxmlformats.org/officeDocument/2006/relationships" xmlns:p="http://schemas.openxmlformats.org/presentationml/2006/main">
   <p:cSld>
     <p:spTree>
@@ -9418,7 +12130,7 @@
 </p:sld>
 </file>
 
-<file path=ppt/slides/slide8.xml><?xml version="1.0" encoding="utf-8"?>
+<file path=ppt/slides/slide9.xml><?xml version="1.0" encoding="utf-8"?>
 <p:sld xmlns:a="http://schemas.openxmlformats.org/drawingml/2006/main" xmlns:r="http://schemas.openxmlformats.org/officeDocument/2006/relationships" xmlns:p="http://schemas.openxmlformats.org/presentationml/2006/main">
   <p:cSld>
     <p:spTree>
@@ -9879,544 +12591,6 @@
 </p:sld>
 </file>
 
-<file path=ppt/slides/slide9.xml><?xml version="1.0" encoding="utf-8"?>
-<p:sld xmlns:a="http://schemas.openxmlformats.org/drawingml/2006/main" xmlns:r="http://schemas.openxmlformats.org/officeDocument/2006/relationships" xmlns:p="http://schemas.openxmlformats.org/presentationml/2006/main">
-  <p:cSld>
-    <p:spTree>
-      <p:nvGrpSpPr>
-        <p:cNvPr id="1" name=""/>
-        <p:cNvGrpSpPr/>
-        <p:nvPr/>
-      </p:nvGrpSpPr>
-      <p:grpSpPr/>
-      <p:sp>
-        <p:nvSpPr>
-          <p:cNvPr id="2" name="标题 1"/>
-          <p:cNvSpPr>
-            <a:spLocks noGrp="1"/>
-          </p:cNvSpPr>
-          <p:nvPr>
-            <p:ph type="title"/>
-          </p:nvPr>
-        </p:nvSpPr>
-        <p:spPr/>
-        <p:txBody>
-          <a:bodyPr/>
-          <a:p>
-            <a:r>
-              <a:rPr lang="en-US" altLang="zh-CN"/>
-              <a:t>Bidirectional Document Calculus</a:t>
-            </a:r>
-            <a:endParaRPr lang="en-US" altLang="zh-CN"/>
-          </a:p>
-        </p:txBody>
-      </p:sp>
-      <p:sp>
-        <p:nvSpPr>
-          <p:cNvPr id="3" name="内容占位符 2"/>
-          <p:cNvSpPr>
-            <a:spLocks noGrp="1"/>
-          </p:cNvSpPr>
-          <p:nvPr>
-            <p:ph idx="1"/>
-          </p:nvPr>
-        </p:nvSpPr>
-        <p:spPr/>
-        <p:txBody>
-          <a:bodyPr/>
-          <a:p>
-            <a:r>
-              <a:rPr lang="en-US" altLang="zh-CN" b="1"/>
-              <a:t>Question:</a:t>
-            </a:r>
-            <a:r>
-              <a:rPr lang="en-US" altLang="zh-CN"/>
-              <a:t> Design the </a:t>
-            </a:r>
-            <a:r>
-              <a:rPr lang="en-US" altLang="zh-CN" b="1">
-                <a:solidFill>
-                  <a:schemeClr val="accent6">
-                    <a:lumMod val="60000"/>
-                    <a:lumOff val="40000"/>
-                  </a:schemeClr>
-                </a:solidFill>
-              </a:rPr>
-              <a:t>Bidirectional Evaluation</a:t>
-            </a:r>
-            <a:r>
-              <a:rPr lang="en-US" altLang="zh-CN"/>
-              <a:t> for the </a:t>
-            </a:r>
-            <a:r>
-              <a:rPr lang="en-US" altLang="zh-CN" b="1">
-                <a:solidFill>
-                  <a:schemeClr val="accent5">
-                    <a:lumMod val="75000"/>
-                  </a:schemeClr>
-                </a:solidFill>
-              </a:rPr>
-              <a:t>Core Calculus of Documents</a:t>
-            </a:r>
-            <a:r>
-              <a:rPr lang="en-US" altLang="zh-CN"/>
-              <a:t> - more specifically - </a:t>
-            </a:r>
-            <a:r>
-              <a:rPr lang="en-US" altLang="zh-CN" b="1">
-                <a:solidFill>
-                  <a:schemeClr val="accent5">
-                    <a:lumMod val="60000"/>
-                    <a:lumOff val="40000"/>
-                  </a:schemeClr>
-                </a:solidFill>
-              </a:rPr>
-              <a:t>Article Template Program</a:t>
-            </a:r>
-            <a:r>
-              <a:rPr lang="en-US" altLang="zh-CN"/>
-              <a:t>. Futhermore, explore the way to </a:t>
-            </a:r>
-            <a:r>
-              <a:rPr lang="en-US" altLang="zh-CN" b="1">
-                <a:solidFill>
-                  <a:schemeClr val="accent4">
-                    <a:lumMod val="75000"/>
-                  </a:schemeClr>
-                </a:solidFill>
-              </a:rPr>
-              <a:t>extend</a:t>
-            </a:r>
-            <a:r>
-              <a:rPr lang="en-US" altLang="zh-CN" b="1"/>
-              <a:t> </a:t>
-            </a:r>
-            <a:r>
-              <a:rPr lang="en-US" altLang="zh-CN"/>
-              <a:t>it </a:t>
-            </a:r>
-            <a:r>
-              <a:rPr lang="en-US" altLang="zh-CN" b="1">
-                <a:solidFill>
-                  <a:schemeClr val="accent4">
-                    <a:lumMod val="75000"/>
-                  </a:schemeClr>
-                </a:solidFill>
-              </a:rPr>
-              <a:t>with reactivity</a:t>
-            </a:r>
-            <a:r>
-              <a:rPr lang="en-US" altLang="zh-CN"/>
-              <a:t>.</a:t>
-            </a:r>
-            <a:endParaRPr lang="en-US" altLang="zh-CN"/>
-          </a:p>
-          <a:p>
-            <a:r>
-              <a:rPr lang="en-US" altLang="zh-CN" b="1"/>
-              <a:t>Motivation Example</a:t>
-            </a:r>
-            <a:r>
-              <a:rPr lang="en-US" altLang="zh-CN" b="1">
-                <a:sym typeface="+mn-ea"/>
-              </a:rPr>
-              <a:t> --</a:t>
-            </a:r>
-            <a:r>
-              <a:rPr lang="en-US" altLang="zh-CN" sz="2000" b="1">
-                <a:sym typeface="+mn-ea"/>
-              </a:rPr>
-              <a:t>structural modification</a:t>
-            </a:r>
-            <a:endParaRPr lang="en-US" altLang="zh-CN"/>
-          </a:p>
-        </p:txBody>
-      </p:sp>
-      <p:pic>
-        <p:nvPicPr>
-          <p:cNvPr id="4" name="图片 3"/>
-          <p:cNvPicPr>
-            <a:picLocks noChangeAspect="1"/>
-          </p:cNvPicPr>
-          <p:nvPr>
-            <p:custDataLst>
-              <p:tags r:id="rId1"/>
-            </p:custDataLst>
-          </p:nvPr>
-        </p:nvPicPr>
-        <p:blipFill>
-          <a:blip r:embed="rId2"/>
-          <a:srcRect l="9725"/>
-          <a:stretch>
-            <a:fillRect/>
-          </a:stretch>
-        </p:blipFill>
-        <p:spPr>
-          <a:xfrm>
-            <a:off x="1134110" y="3767455"/>
-            <a:ext cx="2747010" cy="1536700"/>
-          </a:xfrm>
-          <a:prstGeom prst="rect">
-            <a:avLst/>
-          </a:prstGeom>
-        </p:spPr>
-      </p:pic>
-      <p:pic>
-        <p:nvPicPr>
-          <p:cNvPr id="5" name="图片 4"/>
-          <p:cNvPicPr>
-            <a:picLocks noChangeAspect="1"/>
-          </p:cNvPicPr>
-          <p:nvPr>
-            <p:custDataLst>
-              <p:tags r:id="rId3"/>
-            </p:custDataLst>
-          </p:nvPr>
-        </p:nvPicPr>
-        <p:blipFill>
-          <a:blip r:embed="rId4"/>
-          <a:srcRect l="30378" t="-10461"/>
-          <a:stretch>
-            <a:fillRect/>
-          </a:stretch>
-        </p:blipFill>
-        <p:spPr>
-          <a:xfrm>
-            <a:off x="1134110" y="5851525"/>
-            <a:ext cx="678180" cy="730885"/>
-          </a:xfrm>
-          <a:prstGeom prst="rect">
-            <a:avLst/>
-          </a:prstGeom>
-        </p:spPr>
-      </p:pic>
-      <p:cxnSp>
-        <p:nvCxnSpPr>
-          <p:cNvPr id="6" name="直接箭头连接符 5"/>
-          <p:cNvCxnSpPr/>
-          <p:nvPr/>
-        </p:nvCxnSpPr>
-        <p:spPr>
-          <a:xfrm>
-            <a:off x="1134110" y="5289550"/>
-            <a:ext cx="10160" cy="576580"/>
-          </a:xfrm>
-          <a:prstGeom prst="straightConnector1">
-            <a:avLst/>
-          </a:prstGeom>
-          <a:ln>
-            <a:solidFill>
-              <a:schemeClr val="accent1">
-                <a:lumMod val="40000"/>
-                <a:lumOff val="60000"/>
-              </a:schemeClr>
-            </a:solidFill>
-            <a:tailEnd type="arrow"/>
-          </a:ln>
-        </p:spPr>
-        <p:style>
-          <a:lnRef idx="2">
-            <a:schemeClr val="accent1"/>
-          </a:lnRef>
-          <a:fillRef idx="0">
-            <a:srgbClr val="FFFFFF"/>
-          </a:fillRef>
-          <a:effectRef idx="0">
-            <a:srgbClr val="FFFFFF"/>
-          </a:effectRef>
-          <a:fontRef idx="minor">
-            <a:schemeClr val="tx1"/>
-          </a:fontRef>
-        </p:style>
-      </p:cxnSp>
-      <p:sp>
-        <p:nvSpPr>
-          <p:cNvPr id="7" name="文本框 6"/>
-          <p:cNvSpPr txBox="1"/>
-          <p:nvPr/>
-        </p:nvSpPr>
-        <p:spPr>
-          <a:xfrm>
-            <a:off x="1285875" y="5440045"/>
-            <a:ext cx="1594485" cy="275590"/>
-          </a:xfrm>
-          <a:prstGeom prst="rect">
-            <a:avLst/>
-          </a:prstGeom>
-          <a:noFill/>
-        </p:spPr>
-        <p:txBody>
-          <a:bodyPr wrap="square" rtlCol="0">
-            <a:spAutoFit/>
-          </a:bodyPr>
-          <a:p>
-            <a:r>
-              <a:rPr lang="en-US" altLang="zh-CN" sz="1200"/>
-              <a:t>forward evaluation</a:t>
-            </a:r>
-            <a:endParaRPr lang="en-US" altLang="zh-CN" sz="1200"/>
-          </a:p>
-        </p:txBody>
-      </p:sp>
-      <p:cxnSp>
-        <p:nvCxnSpPr>
-          <p:cNvPr id="8" name="直接箭头连接符 7"/>
-          <p:cNvCxnSpPr/>
-          <p:nvPr>
-            <p:custDataLst>
-              <p:tags r:id="rId5"/>
-            </p:custDataLst>
-          </p:nvPr>
-        </p:nvCxnSpPr>
-        <p:spPr>
-          <a:xfrm>
-            <a:off x="1812290" y="6224270"/>
-            <a:ext cx="3539490" cy="8890"/>
-          </a:xfrm>
-          <a:prstGeom prst="straightConnector1">
-            <a:avLst/>
-          </a:prstGeom>
-          <a:ln>
-            <a:solidFill>
-              <a:schemeClr val="accent1">
-                <a:lumMod val="40000"/>
-                <a:lumOff val="60000"/>
-              </a:schemeClr>
-            </a:solidFill>
-            <a:tailEnd type="arrow"/>
-          </a:ln>
-        </p:spPr>
-        <p:style>
-          <a:lnRef idx="2">
-            <a:schemeClr val="accent1"/>
-          </a:lnRef>
-          <a:fillRef idx="0">
-            <a:srgbClr val="FFFFFF"/>
-          </a:fillRef>
-          <a:effectRef idx="0">
-            <a:srgbClr val="FFFFFF"/>
-          </a:effectRef>
-          <a:fontRef idx="minor">
-            <a:schemeClr val="tx1"/>
-          </a:fontRef>
-        </p:style>
-      </p:cxnSp>
-      <p:sp>
-        <p:nvSpPr>
-          <p:cNvPr id="9" name="文本框 8"/>
-          <p:cNvSpPr txBox="1"/>
-          <p:nvPr>
-            <p:custDataLst>
-              <p:tags r:id="rId6"/>
-            </p:custDataLst>
-          </p:nvPr>
-        </p:nvSpPr>
-        <p:spPr>
-          <a:xfrm>
-            <a:off x="3226435" y="6311900"/>
-            <a:ext cx="654685" cy="275590"/>
-          </a:xfrm>
-          <a:prstGeom prst="rect">
-            <a:avLst/>
-          </a:prstGeom>
-          <a:noFill/>
-        </p:spPr>
-        <p:txBody>
-          <a:bodyPr wrap="square" rtlCol="0">
-            <a:spAutoFit/>
-          </a:bodyPr>
-          <a:p>
-            <a:r>
-              <a:rPr lang="en-US" altLang="zh-CN" sz="1200"/>
-              <a:t>modify</a:t>
-            </a:r>
-            <a:endParaRPr lang="en-US" altLang="zh-CN" sz="1200"/>
-          </a:p>
-        </p:txBody>
-      </p:sp>
-      <p:grpSp>
-        <p:nvGrpSpPr>
-          <p:cNvPr id="12" name="组合 11"/>
-          <p:cNvGrpSpPr/>
-          <p:nvPr/>
-        </p:nvGrpSpPr>
-        <p:grpSpPr>
-          <a:xfrm>
-            <a:off x="5642610" y="6177280"/>
-            <a:ext cx="466090" cy="608330"/>
-            <a:chOff x="9891" y="9728"/>
-            <a:chExt cx="734" cy="958"/>
-          </a:xfrm>
-        </p:grpSpPr>
-        <p:pic>
-          <p:nvPicPr>
-            <p:cNvPr id="10" name="图片 9"/>
-            <p:cNvPicPr>
-              <a:picLocks noChangeAspect="1"/>
-            </p:cNvPicPr>
-            <p:nvPr>
-              <p:custDataLst>
-                <p:tags r:id="rId7"/>
-              </p:custDataLst>
-            </p:nvPr>
-          </p:nvPicPr>
-          <p:blipFill>
-            <a:blip r:embed="rId8"/>
-            <a:stretch>
-              <a:fillRect/>
-            </a:stretch>
-          </p:blipFill>
-          <p:spPr>
-            <a:xfrm>
-              <a:off x="9891" y="9728"/>
-              <a:ext cx="734" cy="958"/>
-            </a:xfrm>
-            <a:prstGeom prst="rect">
-              <a:avLst/>
-            </a:prstGeom>
-          </p:spPr>
-        </p:pic>
-        <p:sp>
-          <p:nvSpPr>
-            <p:cNvPr id="11" name="矩形 10"/>
-            <p:cNvSpPr/>
-            <p:nvPr>
-              <p:custDataLst>
-                <p:tags r:id="rId9"/>
-              </p:custDataLst>
-            </p:nvPr>
-          </p:nvSpPr>
-          <p:spPr>
-            <a:xfrm>
-              <a:off x="9891" y="10374"/>
-              <a:ext cx="735" cy="311"/>
-            </a:xfrm>
-            <a:prstGeom prst="rect">
-              <a:avLst/>
-            </a:prstGeom>
-            <a:noFill/>
-            <a:ln>
-              <a:solidFill>
-                <a:schemeClr val="accent6">
-                  <a:lumMod val="60000"/>
-                  <a:lumOff val="40000"/>
-                </a:schemeClr>
-              </a:solidFill>
-            </a:ln>
-            <a:extLst>
-              <a:ext uri="{909E8E84-426E-40DD-AFC4-6F175D3DCCD1}">
-                <a14:hiddenFill xmlns:a14="http://schemas.microsoft.com/office/drawing/2010/main">
-                  <a:solidFill>
-                    <a:schemeClr val="accent1"/>
-                  </a:solidFill>
-                </a14:hiddenFill>
-              </a:ext>
-            </a:extLst>
-          </p:spPr>
-          <p:style>
-            <a:lnRef idx="2">
-              <a:schemeClr val="accent1">
-                <a:lumMod val="75000"/>
-              </a:schemeClr>
-            </a:lnRef>
-            <a:fillRef idx="1">
-              <a:schemeClr val="accent1"/>
-            </a:fillRef>
-            <a:effectRef idx="0">
-              <a:srgbClr val="FFFFFF"/>
-            </a:effectRef>
-            <a:fontRef idx="minor">
-              <a:schemeClr val="lt1"/>
-            </a:fontRef>
-          </p:style>
-          <p:txBody>
-            <a:bodyPr rtlCol="0" anchor="ctr"/>
-            <a:p>
-              <a:pPr algn="ctr"/>
-              <a:endParaRPr lang="zh-CN" altLang="en-US"/>
-            </a:p>
-          </p:txBody>
-        </p:sp>
-      </p:grpSp>
-      <p:cxnSp>
-        <p:nvCxnSpPr>
-          <p:cNvPr id="15" name="直接箭头连接符 14"/>
-          <p:cNvCxnSpPr/>
-          <p:nvPr>
-            <p:custDataLst>
-              <p:tags r:id="rId10"/>
-            </p:custDataLst>
-          </p:nvPr>
-        </p:nvCxnSpPr>
-        <p:spPr>
-          <a:xfrm>
-            <a:off x="3881120" y="4535805"/>
-            <a:ext cx="1410335" cy="1370330"/>
-          </a:xfrm>
-          <a:prstGeom prst="straightConnector1">
-            <a:avLst/>
-          </a:prstGeom>
-          <a:ln w="9525">
-            <a:headEnd type="arrow"/>
-            <a:tailEnd type="none"/>
-          </a:ln>
-        </p:spPr>
-        <p:style>
-          <a:lnRef idx="2">
-            <a:schemeClr val="accent1"/>
-          </a:lnRef>
-          <a:fillRef idx="0">
-            <a:srgbClr val="FFFFFF"/>
-          </a:fillRef>
-          <a:effectRef idx="0">
-            <a:srgbClr val="FFFFFF"/>
-          </a:effectRef>
-          <a:fontRef idx="minor">
-            <a:schemeClr val="tx1"/>
-          </a:fontRef>
-        </p:style>
-      </p:cxnSp>
-      <p:sp>
-        <p:nvSpPr>
-          <p:cNvPr id="16" name="文本框 15"/>
-          <p:cNvSpPr txBox="1"/>
-          <p:nvPr>
-            <p:custDataLst>
-              <p:tags r:id="rId11"/>
-            </p:custDataLst>
-          </p:nvPr>
-        </p:nvSpPr>
-        <p:spPr>
-          <a:xfrm>
-            <a:off x="4551045" y="4973320"/>
-            <a:ext cx="1544955" cy="275590"/>
-          </a:xfrm>
-          <a:prstGeom prst="rect">
-            <a:avLst/>
-          </a:prstGeom>
-          <a:noFill/>
-        </p:spPr>
-        <p:txBody>
-          <a:bodyPr wrap="square" rtlCol="0">
-            <a:spAutoFit/>
-          </a:bodyPr>
-          <a:p>
-            <a:r>
-              <a:rPr lang="en-US" altLang="zh-CN" sz="1200"/>
-              <a:t>backward evaluation</a:t>
-            </a:r>
-            <a:endParaRPr lang="en-US" altLang="zh-CN" sz="1200"/>
-          </a:p>
-        </p:txBody>
-      </p:sp>
-    </p:spTree>
-  </p:cSld>
-  <p:clrMapOvr>
-    <a:masterClrMapping/>
-  </p:clrMapOvr>
-</p:sld>
-</file>
-
 <file path=ppt/tags/tag1.xml><?xml version="1.0" encoding="utf-8"?>
 <p:tagLst xmlns:p="http://schemas.openxmlformats.org/presentationml/2006/main">
   <p:tag name="KSO_WM_BEAUTIFY_FLAG" val=""/>
@@ -10851,13 +13025,91 @@
 
 <file path=ppt/tags/tag75.xml><?xml version="1.0" encoding="utf-8"?>
 <p:tagLst xmlns:p="http://schemas.openxmlformats.org/presentationml/2006/main">
-  <p:tag name="commondata" val="eyJoZGlkIjoiMjI1MzBjY2Q1OGQ3YTgyZWQ2MWFlZmNiNTliOWFkZTIifQ=="/>
+  <p:tag name="KSO_WM_BEAUTIFY_FLAG" val=""/>
+</p:tagLst>
+</file>
+
+<file path=ppt/tags/tag76.xml><?xml version="1.0" encoding="utf-8"?>
+<p:tagLst xmlns:p="http://schemas.openxmlformats.org/presentationml/2006/main">
+  <p:tag name="KSO_WM_BEAUTIFY_FLAG" val=""/>
+</p:tagLst>
+</file>
+
+<file path=ppt/tags/tag77.xml><?xml version="1.0" encoding="utf-8"?>
+<p:tagLst xmlns:p="http://schemas.openxmlformats.org/presentationml/2006/main">
+  <p:tag name="KSO_WM_BEAUTIFY_FLAG" val=""/>
+</p:tagLst>
+</file>
+
+<file path=ppt/tags/tag78.xml><?xml version="1.0" encoding="utf-8"?>
+<p:tagLst xmlns:p="http://schemas.openxmlformats.org/presentationml/2006/main">
+  <p:tag name="KSO_WM_BEAUTIFY_FLAG" val=""/>
+</p:tagLst>
+</file>
+
+<file path=ppt/tags/tag79.xml><?xml version="1.0" encoding="utf-8"?>
+<p:tagLst xmlns:p="http://schemas.openxmlformats.org/presentationml/2006/main">
+  <p:tag name="KSO_WM_BEAUTIFY_FLAG" val=""/>
 </p:tagLst>
 </file>
 
 <file path=ppt/tags/tag8.xml><?xml version="1.0" encoding="utf-8"?>
 <p:tagLst xmlns:p="http://schemas.openxmlformats.org/presentationml/2006/main">
   <p:tag name="KSO_WM_BEAUTIFY_FLAG" val=""/>
+</p:tagLst>
+</file>
+
+<file path=ppt/tags/tag80.xml><?xml version="1.0" encoding="utf-8"?>
+<p:tagLst xmlns:p="http://schemas.openxmlformats.org/presentationml/2006/main">
+  <p:tag name="KSO_WM_BEAUTIFY_FLAG" val=""/>
+</p:tagLst>
+</file>
+
+<file path=ppt/tags/tag81.xml><?xml version="1.0" encoding="utf-8"?>
+<p:tagLst xmlns:p="http://schemas.openxmlformats.org/presentationml/2006/main">
+  <p:tag name="KSO_WM_BEAUTIFY_FLAG" val=""/>
+</p:tagLst>
+</file>
+
+<file path=ppt/tags/tag82.xml><?xml version="1.0" encoding="utf-8"?>
+<p:tagLst xmlns:p="http://schemas.openxmlformats.org/presentationml/2006/main">
+  <p:tag name="KSO_WM_BEAUTIFY_FLAG" val=""/>
+</p:tagLst>
+</file>
+
+<file path=ppt/tags/tag83.xml><?xml version="1.0" encoding="utf-8"?>
+<p:tagLst xmlns:p="http://schemas.openxmlformats.org/presentationml/2006/main">
+  <p:tag name="KSO_WM_BEAUTIFY_FLAG" val=""/>
+</p:tagLst>
+</file>
+
+<file path=ppt/tags/tag84.xml><?xml version="1.0" encoding="utf-8"?>
+<p:tagLst xmlns:p="http://schemas.openxmlformats.org/presentationml/2006/main">
+  <p:tag name="KSO_WM_BEAUTIFY_FLAG" val=""/>
+</p:tagLst>
+</file>
+
+<file path=ppt/tags/tag85.xml><?xml version="1.0" encoding="utf-8"?>
+<p:tagLst xmlns:p="http://schemas.openxmlformats.org/presentationml/2006/main">
+  <p:tag name="KSO_WM_BEAUTIFY_FLAG" val=""/>
+</p:tagLst>
+</file>
+
+<file path=ppt/tags/tag86.xml><?xml version="1.0" encoding="utf-8"?>
+<p:tagLst xmlns:p="http://schemas.openxmlformats.org/presentationml/2006/main">
+  <p:tag name="KSO_WM_BEAUTIFY_FLAG" val=""/>
+</p:tagLst>
+</file>
+
+<file path=ppt/tags/tag87.xml><?xml version="1.0" encoding="utf-8"?>
+<p:tagLst xmlns:p="http://schemas.openxmlformats.org/presentationml/2006/main">
+  <p:tag name="KSO_WM_BEAUTIFY_FLAG" val=""/>
+</p:tagLst>
+</file>
+
+<file path=ppt/tags/tag88.xml><?xml version="1.0" encoding="utf-8"?>
+<p:tagLst xmlns:p="http://schemas.openxmlformats.org/presentationml/2006/main">
+  <p:tag name="commondata" val="eyJoZGlkIjoiMjI1MzBjY2Q1OGQ3YTgyZWQ2MWFlZmNiNTliOWFkZTIifQ=="/>
 </p:tagLst>
 </file>
 

</xml_diff>